<commit_message>
Added methodology results and conclusion
</commit_message>
<xml_diff>
--- a/C351 Presentation.pptx
+++ b/C351 Presentation.pptx
@@ -4519,7 +4519,7 @@
         <p:spPr bwMode="auto">
           <a:xfrm>
             <a:off x="11718614" y="8610600"/>
-            <a:ext cx="9598176" cy="11994543"/>
+            <a:ext cx="9598176" cy="15786351"/>
           </a:xfrm>
           <a:prstGeom prst="rect">
             <a:avLst/>
@@ -4966,6 +4966,21 @@
               <a:latin typeface="Quattrocento Sans" panose="020B0502050000020003" pitchFamily="34" charset="0"/>
               <a:cs typeface="Arial" pitchFamily="34" charset="0"/>
             </a:endParaRPr>
+          </a:p>
+          <a:p>
+            <a:pPr algn="just">
+              <a:lnSpc>
+                <a:spcPct val="110000"/>
+              </a:lnSpc>
+            </a:pPr>
+            <a:r>
+              <a:rPr lang="en-US" sz="2800" dirty="0">
+                <a:effectLst/>
+                <a:latin typeface="Quattrocento Sans" panose="020B0502050000020003" pitchFamily="34" charset="0"/>
+                <a:cs typeface="Arial" pitchFamily="34" charset="0"/>
+              </a:rPr>
+              <a:t>We created our artificial neural network with the Python package TensorFlow. Our model consists of three 64 node hidden layers a dropout layer to prevent over fitting, and we use Adam as our gradient decent optimizer. We experimented with multiple types of neural networks including convolutional and recurrent neural networks, but our results had shown a conventional feed-forward artificial neural network provided the best results. </a:t>
+            </a:r>
           </a:p>
           <a:p>
             <a:pPr algn="just">
@@ -5052,7 +5067,7 @@
         </p:nvSpPr>
         <p:spPr>
           <a:xfrm>
-            <a:off x="22316522" y="8000999"/>
+            <a:off x="22316522" y="8077200"/>
             <a:ext cx="10058400" cy="24231600"/>
           </a:xfrm>
           <a:prstGeom prst="rect">
@@ -5113,7 +5128,7 @@
         <p:spPr bwMode="auto">
           <a:xfrm>
             <a:off x="22546635" y="8610600"/>
-            <a:ext cx="9598176" cy="5195824"/>
+            <a:ext cx="9598176" cy="18602571"/>
           </a:xfrm>
           <a:prstGeom prst="rect">
             <a:avLst/>
@@ -5491,19 +5506,576 @@
             </a:endParaRPr>
           </a:p>
           <a:p>
+            <a:pPr marL="0" marR="0" lvl="0" indent="0" algn="just" defTabSz="914400" rtl="0" eaLnBrk="0" fontAlgn="base" latinLnBrk="0" hangingPunct="0">
+              <a:lnSpc>
+                <a:spcPct val="110000"/>
+              </a:lnSpc>
+              <a:spcBef>
+                <a:spcPct val="0"/>
+              </a:spcBef>
+              <a:spcAft>
+                <a:spcPct val="0"/>
+              </a:spcAft>
+              <a:buClrTx/>
+              <a:buSzTx/>
+              <a:buFontTx/>
+              <a:buNone/>
+              <a:tabLst/>
+              <a:defRPr/>
+            </a:pPr>
+            <a:endParaRPr kumimoji="0" lang="en-US" sz="3600" b="0" i="0" u="none" strike="noStrike" kern="1200" cap="none" spc="0" normalizeH="0" baseline="0" noProof="0" dirty="0">
+              <a:ln>
+                <a:noFill/>
+              </a:ln>
+              <a:solidFill>
+                <a:prstClr val="black"/>
+              </a:solidFill>
+              <a:effectLst/>
+              <a:uLnTx/>
+              <a:uFillTx/>
+              <a:latin typeface="Quattrocento Sans" panose="020B0502050000020003" pitchFamily="34" charset="0"/>
+              <a:cs typeface="Arial" pitchFamily="34" charset="0"/>
+            </a:endParaRPr>
+          </a:p>
+          <a:p>
+            <a:pPr marL="0" marR="0" lvl="0" indent="0" algn="just" defTabSz="914400" rtl="0" eaLnBrk="0" fontAlgn="base" latinLnBrk="0" hangingPunct="0">
+              <a:lnSpc>
+                <a:spcPct val="110000"/>
+              </a:lnSpc>
+              <a:spcBef>
+                <a:spcPct val="0"/>
+              </a:spcBef>
+              <a:spcAft>
+                <a:spcPct val="0"/>
+              </a:spcAft>
+              <a:buClrTx/>
+              <a:buSzTx/>
+              <a:buFontTx/>
+              <a:buNone/>
+              <a:tabLst/>
+              <a:defRPr/>
+            </a:pPr>
+            <a:endParaRPr lang="en-US" sz="3600" dirty="0">
+              <a:solidFill>
+                <a:prstClr val="black"/>
+              </a:solidFill>
+              <a:effectLst/>
+              <a:latin typeface="Quattrocento Sans" panose="020B0502050000020003" pitchFamily="34" charset="0"/>
+              <a:cs typeface="Arial" pitchFamily="34" charset="0"/>
+            </a:endParaRPr>
+          </a:p>
+          <a:p>
+            <a:pPr marL="0" marR="0" lvl="0" indent="0" algn="just" defTabSz="914400" rtl="0" eaLnBrk="0" fontAlgn="base" latinLnBrk="0" hangingPunct="0">
+              <a:lnSpc>
+                <a:spcPct val="110000"/>
+              </a:lnSpc>
+              <a:spcBef>
+                <a:spcPct val="0"/>
+              </a:spcBef>
+              <a:spcAft>
+                <a:spcPct val="0"/>
+              </a:spcAft>
+              <a:buClrTx/>
+              <a:buSzTx/>
+              <a:buFontTx/>
+              <a:buNone/>
+              <a:tabLst/>
+              <a:defRPr/>
+            </a:pPr>
+            <a:endParaRPr kumimoji="0" lang="en-US" sz="3600" b="0" i="0" u="none" strike="noStrike" kern="1200" cap="none" spc="0" normalizeH="0" baseline="0" noProof="0" dirty="0">
+              <a:ln>
+                <a:noFill/>
+              </a:ln>
+              <a:solidFill>
+                <a:prstClr val="black"/>
+              </a:solidFill>
+              <a:effectLst/>
+              <a:uLnTx/>
+              <a:uFillTx/>
+              <a:latin typeface="Quattrocento Sans" panose="020B0502050000020003" pitchFamily="34" charset="0"/>
+              <a:cs typeface="Arial" pitchFamily="34" charset="0"/>
+            </a:endParaRPr>
+          </a:p>
+          <a:p>
+            <a:pPr marL="0" marR="0" lvl="0" indent="0" algn="just" defTabSz="914400" rtl="0" eaLnBrk="0" fontAlgn="base" latinLnBrk="0" hangingPunct="0">
+              <a:lnSpc>
+                <a:spcPct val="110000"/>
+              </a:lnSpc>
+              <a:spcBef>
+                <a:spcPct val="0"/>
+              </a:spcBef>
+              <a:spcAft>
+                <a:spcPct val="0"/>
+              </a:spcAft>
+              <a:buClrTx/>
+              <a:buSzTx/>
+              <a:buFontTx/>
+              <a:buNone/>
+              <a:tabLst/>
+              <a:defRPr/>
+            </a:pPr>
+            <a:endParaRPr lang="en-US" sz="3600" noProof="0" dirty="0">
+              <a:solidFill>
+                <a:prstClr val="black"/>
+              </a:solidFill>
+              <a:effectLst/>
+              <a:latin typeface="Quattrocento Sans" panose="020B0502050000020003" pitchFamily="34" charset="0"/>
+              <a:cs typeface="Arial" pitchFamily="34" charset="0"/>
+            </a:endParaRPr>
+          </a:p>
+          <a:p>
+            <a:pPr marL="0" marR="0" lvl="0" indent="0" algn="just" defTabSz="914400" rtl="0" eaLnBrk="0" fontAlgn="base" latinLnBrk="0" hangingPunct="0">
+              <a:lnSpc>
+                <a:spcPct val="110000"/>
+              </a:lnSpc>
+              <a:spcBef>
+                <a:spcPct val="0"/>
+              </a:spcBef>
+              <a:spcAft>
+                <a:spcPct val="0"/>
+              </a:spcAft>
+              <a:buClrTx/>
+              <a:buSzTx/>
+              <a:buFontTx/>
+              <a:buNone/>
+              <a:tabLst/>
+              <a:defRPr/>
+            </a:pPr>
+            <a:endParaRPr kumimoji="0" lang="en-US" sz="3600" b="0" i="0" u="none" strike="noStrike" kern="1200" cap="none" spc="0" normalizeH="0" baseline="0" noProof="0" dirty="0">
+              <a:ln>
+                <a:noFill/>
+              </a:ln>
+              <a:solidFill>
+                <a:prstClr val="black"/>
+              </a:solidFill>
+              <a:effectLst/>
+              <a:uLnTx/>
+              <a:uFillTx/>
+              <a:latin typeface="Quattrocento Sans" panose="020B0502050000020003" pitchFamily="34" charset="0"/>
+              <a:cs typeface="Arial" pitchFamily="34" charset="0"/>
+            </a:endParaRPr>
+          </a:p>
+          <a:p>
+            <a:pPr marL="0" marR="0" lvl="0" indent="0" algn="just" defTabSz="914400" rtl="0" eaLnBrk="0" fontAlgn="base" latinLnBrk="0" hangingPunct="0">
+              <a:lnSpc>
+                <a:spcPct val="110000"/>
+              </a:lnSpc>
+              <a:spcBef>
+                <a:spcPct val="0"/>
+              </a:spcBef>
+              <a:spcAft>
+                <a:spcPct val="0"/>
+              </a:spcAft>
+              <a:buClrTx/>
+              <a:buSzTx/>
+              <a:buFontTx/>
+              <a:buNone/>
+              <a:tabLst/>
+              <a:defRPr/>
+            </a:pPr>
+            <a:endParaRPr kumimoji="0" lang="en-US" sz="3600" b="0" i="0" u="none" strike="noStrike" kern="1200" cap="none" spc="0" normalizeH="0" baseline="0" noProof="0" dirty="0">
+              <a:ln>
+                <a:noFill/>
+              </a:ln>
+              <a:solidFill>
+                <a:prstClr val="black"/>
+              </a:solidFill>
+              <a:effectLst/>
+              <a:uLnTx/>
+              <a:uFillTx/>
+              <a:latin typeface="Quattrocento Sans" panose="020B0502050000020003" pitchFamily="34" charset="0"/>
+              <a:cs typeface="Arial" pitchFamily="34" charset="0"/>
+            </a:endParaRPr>
+          </a:p>
+          <a:p>
+            <a:pPr marL="0" marR="0" lvl="0" indent="0" algn="just" defTabSz="914400" rtl="0" eaLnBrk="0" fontAlgn="base" latinLnBrk="0" hangingPunct="0">
+              <a:lnSpc>
+                <a:spcPct val="110000"/>
+              </a:lnSpc>
+              <a:spcBef>
+                <a:spcPct val="0"/>
+              </a:spcBef>
+              <a:spcAft>
+                <a:spcPct val="0"/>
+              </a:spcAft>
+              <a:buClrTx/>
+              <a:buSzTx/>
+              <a:buFontTx/>
+              <a:buNone/>
+              <a:tabLst/>
+              <a:defRPr/>
+            </a:pPr>
+            <a:r>
+              <a:rPr kumimoji="0" lang="en-US" sz="3600" b="0" i="0" u="none" strike="noStrike" kern="1200" cap="none" spc="0" normalizeH="0" baseline="0" noProof="0" dirty="0">
+                <a:ln>
+                  <a:noFill/>
+                </a:ln>
+                <a:solidFill>
+                  <a:prstClr val="black"/>
+                </a:solidFill>
+                <a:effectLst/>
+                <a:uLnTx/>
+                <a:uFillTx/>
+                <a:latin typeface="Quattrocento Sans" panose="020B0502050000020003" pitchFamily="34" charset="0"/>
+                <a:cs typeface="Arial" pitchFamily="34" charset="0"/>
+              </a:rPr>
+              <a:t>Neural Network Results</a:t>
+            </a:r>
+          </a:p>
+          <a:p>
+            <a:pPr marL="0" marR="0" lvl="0" indent="0" algn="just" defTabSz="914400" rtl="0" eaLnBrk="0" fontAlgn="base" latinLnBrk="0" hangingPunct="0">
+              <a:lnSpc>
+                <a:spcPct val="110000"/>
+              </a:lnSpc>
+              <a:spcBef>
+                <a:spcPct val="0"/>
+              </a:spcBef>
+              <a:spcAft>
+                <a:spcPct val="0"/>
+              </a:spcAft>
+              <a:buClrTx/>
+              <a:buSzTx/>
+              <a:buFontTx/>
+              <a:buNone/>
+              <a:tabLst/>
+              <a:defRPr/>
+            </a:pPr>
+            <a:endParaRPr kumimoji="0" lang="en-US" sz="3600" b="0" i="0" u="none" strike="noStrike" kern="1200" cap="none" spc="0" normalizeH="0" baseline="0" noProof="0" dirty="0">
+              <a:ln>
+                <a:noFill/>
+              </a:ln>
+              <a:solidFill>
+                <a:prstClr val="black"/>
+              </a:solidFill>
+              <a:effectLst/>
+              <a:uLnTx/>
+              <a:uFillTx/>
+              <a:latin typeface="Quattrocento Sans" panose="020B0502050000020003" pitchFamily="34" charset="0"/>
+              <a:cs typeface="Arial" pitchFamily="34" charset="0"/>
+            </a:endParaRPr>
+          </a:p>
+          <a:p>
+            <a:pPr marL="0" marR="0" lvl="0" indent="0" algn="just" defTabSz="914400" rtl="0" eaLnBrk="0" fontAlgn="base" latinLnBrk="0" hangingPunct="0">
+              <a:lnSpc>
+                <a:spcPct val="110000"/>
+              </a:lnSpc>
+              <a:spcBef>
+                <a:spcPct val="0"/>
+              </a:spcBef>
+              <a:spcAft>
+                <a:spcPct val="0"/>
+              </a:spcAft>
+              <a:buClrTx/>
+              <a:buSzTx/>
+              <a:buFontTx/>
+              <a:buNone/>
+              <a:tabLst/>
+              <a:defRPr/>
+            </a:pPr>
+            <a:endParaRPr lang="en-US" sz="3600" dirty="0">
+              <a:solidFill>
+                <a:prstClr val="black"/>
+              </a:solidFill>
+              <a:effectLst/>
+              <a:latin typeface="Quattrocento Sans" panose="020B0502050000020003" pitchFamily="34" charset="0"/>
+              <a:cs typeface="Arial" pitchFamily="34" charset="0"/>
+            </a:endParaRPr>
+          </a:p>
+          <a:p>
+            <a:pPr marL="0" marR="0" lvl="0" indent="0" algn="just" defTabSz="914400" rtl="0" eaLnBrk="0" fontAlgn="base" latinLnBrk="0" hangingPunct="0">
+              <a:lnSpc>
+                <a:spcPct val="110000"/>
+              </a:lnSpc>
+              <a:spcBef>
+                <a:spcPct val="0"/>
+              </a:spcBef>
+              <a:spcAft>
+                <a:spcPct val="0"/>
+              </a:spcAft>
+              <a:buClrTx/>
+              <a:buSzTx/>
+              <a:buFontTx/>
+              <a:buNone/>
+              <a:tabLst/>
+              <a:defRPr/>
+            </a:pPr>
+            <a:endParaRPr kumimoji="0" lang="en-US" sz="3600" b="0" i="0" u="none" strike="noStrike" kern="1200" cap="none" spc="0" normalizeH="0" baseline="0" noProof="0" dirty="0">
+              <a:ln>
+                <a:noFill/>
+              </a:ln>
+              <a:solidFill>
+                <a:prstClr val="black"/>
+              </a:solidFill>
+              <a:effectLst/>
+              <a:uLnTx/>
+              <a:uFillTx/>
+              <a:latin typeface="Quattrocento Sans" panose="020B0502050000020003" pitchFamily="34" charset="0"/>
+              <a:cs typeface="Arial" pitchFamily="34" charset="0"/>
+            </a:endParaRPr>
+          </a:p>
+          <a:p>
+            <a:pPr marL="0" marR="0" lvl="0" indent="0" algn="just" defTabSz="914400" rtl="0" eaLnBrk="0" fontAlgn="base" latinLnBrk="0" hangingPunct="0">
+              <a:lnSpc>
+                <a:spcPct val="110000"/>
+              </a:lnSpc>
+              <a:spcBef>
+                <a:spcPct val="0"/>
+              </a:spcBef>
+              <a:spcAft>
+                <a:spcPct val="0"/>
+              </a:spcAft>
+              <a:buClrTx/>
+              <a:buSzTx/>
+              <a:buFontTx/>
+              <a:buNone/>
+              <a:tabLst/>
+              <a:defRPr/>
+            </a:pPr>
+            <a:endParaRPr lang="en-US" sz="3600" dirty="0">
+              <a:solidFill>
+                <a:prstClr val="black"/>
+              </a:solidFill>
+              <a:effectLst/>
+              <a:latin typeface="Quattrocento Sans" panose="020B0502050000020003" pitchFamily="34" charset="0"/>
+              <a:cs typeface="Arial" pitchFamily="34" charset="0"/>
+            </a:endParaRPr>
+          </a:p>
+          <a:p>
+            <a:pPr marL="0" marR="0" lvl="0" indent="0" algn="just" defTabSz="914400" rtl="0" eaLnBrk="0" fontAlgn="base" latinLnBrk="0" hangingPunct="0">
+              <a:lnSpc>
+                <a:spcPct val="110000"/>
+              </a:lnSpc>
+              <a:spcBef>
+                <a:spcPct val="0"/>
+              </a:spcBef>
+              <a:spcAft>
+                <a:spcPct val="0"/>
+              </a:spcAft>
+              <a:buClrTx/>
+              <a:buSzTx/>
+              <a:buFontTx/>
+              <a:buNone/>
+              <a:tabLst/>
+              <a:defRPr/>
+            </a:pPr>
+            <a:endParaRPr kumimoji="0" lang="en-US" sz="3600" b="0" i="0" u="none" strike="noStrike" kern="1200" cap="none" spc="0" normalizeH="0" baseline="0" noProof="0" dirty="0">
+              <a:ln>
+                <a:noFill/>
+              </a:ln>
+              <a:solidFill>
+                <a:prstClr val="black"/>
+              </a:solidFill>
+              <a:effectLst/>
+              <a:uLnTx/>
+              <a:uFillTx/>
+              <a:latin typeface="Quattrocento Sans" panose="020B0502050000020003" pitchFamily="34" charset="0"/>
+              <a:cs typeface="Arial" pitchFamily="34" charset="0"/>
+            </a:endParaRPr>
+          </a:p>
+          <a:p>
+            <a:pPr marL="0" marR="0" lvl="0" indent="0" algn="just" defTabSz="914400" rtl="0" eaLnBrk="0" fontAlgn="base" latinLnBrk="0" hangingPunct="0">
+              <a:lnSpc>
+                <a:spcPct val="110000"/>
+              </a:lnSpc>
+              <a:spcBef>
+                <a:spcPct val="0"/>
+              </a:spcBef>
+              <a:spcAft>
+                <a:spcPct val="0"/>
+              </a:spcAft>
+              <a:buClrTx/>
+              <a:buSzTx/>
+              <a:buFontTx/>
+              <a:buNone/>
+              <a:tabLst/>
+              <a:defRPr/>
+            </a:pPr>
+            <a:endParaRPr lang="en-US" sz="3600" dirty="0">
+              <a:solidFill>
+                <a:prstClr val="black"/>
+              </a:solidFill>
+              <a:effectLst/>
+              <a:latin typeface="Quattrocento Sans" panose="020B0502050000020003" pitchFamily="34" charset="0"/>
+              <a:cs typeface="Arial" pitchFamily="34" charset="0"/>
+            </a:endParaRPr>
+          </a:p>
+          <a:p>
+            <a:pPr marL="0" marR="0" lvl="0" indent="0" algn="just" defTabSz="914400" rtl="0" eaLnBrk="0" fontAlgn="base" latinLnBrk="0" hangingPunct="0">
+              <a:lnSpc>
+                <a:spcPct val="110000"/>
+              </a:lnSpc>
+              <a:spcBef>
+                <a:spcPct val="0"/>
+              </a:spcBef>
+              <a:spcAft>
+                <a:spcPct val="0"/>
+              </a:spcAft>
+              <a:buClrTx/>
+              <a:buSzTx/>
+              <a:buFontTx/>
+              <a:buNone/>
+              <a:tabLst/>
+              <a:defRPr/>
+            </a:pPr>
+            <a:endParaRPr kumimoji="0" lang="en-US" sz="3600" b="0" i="0" u="none" strike="noStrike" kern="1200" cap="none" spc="0" normalizeH="0" baseline="0" noProof="0" dirty="0">
+              <a:ln>
+                <a:noFill/>
+              </a:ln>
+              <a:solidFill>
+                <a:prstClr val="black"/>
+              </a:solidFill>
+              <a:effectLst/>
+              <a:uLnTx/>
+              <a:uFillTx/>
+              <a:latin typeface="Quattrocento Sans" panose="020B0502050000020003" pitchFamily="34" charset="0"/>
+              <a:cs typeface="Arial" pitchFamily="34" charset="0"/>
+            </a:endParaRPr>
+          </a:p>
+          <a:p>
+            <a:pPr marL="0" marR="0" lvl="0" indent="0" algn="just" defTabSz="914400" rtl="0" eaLnBrk="0" fontAlgn="base" latinLnBrk="0" hangingPunct="0">
+              <a:lnSpc>
+                <a:spcPct val="110000"/>
+              </a:lnSpc>
+              <a:spcBef>
+                <a:spcPct val="0"/>
+              </a:spcBef>
+              <a:spcAft>
+                <a:spcPct val="0"/>
+              </a:spcAft>
+              <a:buClrTx/>
+              <a:buSzTx/>
+              <a:buFontTx/>
+              <a:buNone/>
+              <a:tabLst/>
+              <a:defRPr/>
+            </a:pPr>
+            <a:endParaRPr kumimoji="0" lang="en-US" sz="3600" b="0" i="0" u="none" strike="noStrike" kern="1200" cap="none" spc="0" normalizeH="0" baseline="0" noProof="0" dirty="0">
+              <a:ln>
+                <a:noFill/>
+              </a:ln>
+              <a:solidFill>
+                <a:prstClr val="black"/>
+              </a:solidFill>
+              <a:effectLst/>
+              <a:uLnTx/>
+              <a:uFillTx/>
+              <a:latin typeface="Quattrocento Sans" panose="020B0502050000020003" pitchFamily="34" charset="0"/>
+              <a:cs typeface="Arial" pitchFamily="34" charset="0"/>
+            </a:endParaRPr>
+          </a:p>
+          <a:p>
+            <a:pPr marL="0" marR="0" lvl="0" indent="0" algn="just" defTabSz="914400" rtl="0" eaLnBrk="0" fontAlgn="base" latinLnBrk="0" hangingPunct="0">
+              <a:lnSpc>
+                <a:spcPct val="110000"/>
+              </a:lnSpc>
+              <a:spcBef>
+                <a:spcPct val="0"/>
+              </a:spcBef>
+              <a:spcAft>
+                <a:spcPct val="0"/>
+              </a:spcAft>
+              <a:buClrTx/>
+              <a:buSzTx/>
+              <a:buFontTx/>
+              <a:buNone/>
+              <a:tabLst/>
+              <a:defRPr/>
+            </a:pPr>
+            <a:endParaRPr kumimoji="0" lang="en-US" sz="2800" b="0" i="0" u="none" strike="noStrike" kern="1200" cap="none" spc="0" normalizeH="0" baseline="0" noProof="0" dirty="0">
+              <a:ln>
+                <a:noFill/>
+              </a:ln>
+              <a:solidFill>
+                <a:prstClr val="black"/>
+              </a:solidFill>
+              <a:effectLst/>
+              <a:uLnTx/>
+              <a:uFillTx/>
+              <a:latin typeface="Quattrocento Sans" panose="020B0502050000020003" pitchFamily="34" charset="0"/>
+              <a:cs typeface="Arial" pitchFamily="34" charset="0"/>
+            </a:endParaRPr>
+          </a:p>
+          <a:p>
+            <a:pPr marL="0" marR="0" lvl="0" indent="0" algn="just" defTabSz="914400" rtl="0" eaLnBrk="0" fontAlgn="base" latinLnBrk="0" hangingPunct="0">
+              <a:lnSpc>
+                <a:spcPct val="110000"/>
+              </a:lnSpc>
+              <a:spcBef>
+                <a:spcPct val="0"/>
+              </a:spcBef>
+              <a:spcAft>
+                <a:spcPct val="0"/>
+              </a:spcAft>
+              <a:buClrTx/>
+              <a:buSzTx/>
+              <a:buFontTx/>
+              <a:buNone/>
+              <a:tabLst/>
+              <a:defRPr/>
+            </a:pPr>
+            <a:r>
+              <a:rPr kumimoji="0" lang="en-US" sz="2800" b="0" i="0" u="none" strike="noStrike" kern="1200" cap="none" spc="0" normalizeH="0" baseline="0" noProof="0" dirty="0">
+                <a:ln>
+                  <a:noFill/>
+                </a:ln>
+                <a:solidFill>
+                  <a:prstClr val="black"/>
+                </a:solidFill>
+                <a:effectLst/>
+                <a:uLnTx/>
+                <a:uFillTx/>
+                <a:latin typeface="Quattrocento Sans" panose="020B0502050000020003" pitchFamily="34" charset="0"/>
+                <a:cs typeface="Arial" pitchFamily="34" charset="0"/>
+              </a:rPr>
+              <a:t>We created our artificial neural network with the Python package TensorFlow. Our model consists of three 64 node hidden layers a dropout layer to prevent over fitting, and we use Adam as our gradient decent optimizer. </a:t>
+            </a:r>
+          </a:p>
+          <a:p>
+            <a:pPr marL="0" marR="0" lvl="0" indent="0" algn="just" defTabSz="914400" rtl="0" eaLnBrk="0" fontAlgn="base" latinLnBrk="0" hangingPunct="0">
+              <a:lnSpc>
+                <a:spcPct val="110000"/>
+              </a:lnSpc>
+              <a:spcBef>
+                <a:spcPct val="0"/>
+              </a:spcBef>
+              <a:spcAft>
+                <a:spcPct val="0"/>
+              </a:spcAft>
+              <a:buClrTx/>
+              <a:buSzTx/>
+              <a:buFontTx/>
+              <a:buNone/>
+              <a:tabLst/>
+              <a:defRPr/>
+            </a:pPr>
+            <a:r>
+              <a:rPr kumimoji="0" lang="en-US" sz="2800" b="0" i="0" u="none" strike="noStrike" kern="1200" cap="none" spc="0" normalizeH="0" baseline="0" noProof="0" dirty="0">
+                <a:ln>
+                  <a:noFill/>
+                </a:ln>
+                <a:solidFill>
+                  <a:prstClr val="black"/>
+                </a:solidFill>
+                <a:effectLst/>
+                <a:uLnTx/>
+                <a:uFillTx/>
+                <a:latin typeface="Quattrocento Sans" panose="020B0502050000020003" pitchFamily="34" charset="0"/>
+                <a:cs typeface="Arial" pitchFamily="34" charset="0"/>
+              </a:rPr>
+              <a:t>We experimented with multiple types of neural networks including convolutional and recurrent neural networks, but our results had shown a conventional feed-forward artificial neural network provided the best results. </a:t>
+            </a:r>
+          </a:p>
+          <a:p>
             <a:pPr algn="just">
               <a:lnSpc>
                 <a:spcPct val="110000"/>
               </a:lnSpc>
             </a:pPr>
-            <a:r>
-              <a:rPr lang="en-US" sz="1400" dirty="0">
-                <a:effectLst/>
-                <a:latin typeface="Quattrocento Sans" panose="020B0502050000020003" pitchFamily="34" charset="0"/>
-                <a:cs typeface="Arial" pitchFamily="34" charset="0"/>
-              </a:rPr>
-              <a:t>Text</a:t>
-            </a:r>
+            <a:endParaRPr lang="en-US" sz="1400" dirty="0">
+              <a:effectLst/>
+              <a:latin typeface="Quattrocento Sans" panose="020B0502050000020003" pitchFamily="34" charset="0"/>
+              <a:cs typeface="Arial" pitchFamily="34" charset="0"/>
+            </a:endParaRPr>
           </a:p>
         </p:txBody>
       </p:sp>
@@ -5616,7 +6188,7 @@
           </a:lstStyle>
           <a:p>
             <a:pPr algn="ctr"/>
-            <a:endParaRPr lang="en-US" sz="9600">
+            <a:endParaRPr lang="en-US" sz="9600" dirty="0">
               <a:latin typeface="+mj-lt"/>
             </a:endParaRPr>
           </a:p>
@@ -5639,7 +6211,7 @@
         <p:spPr bwMode="auto">
           <a:xfrm>
             <a:off x="33374654" y="8610600"/>
-            <a:ext cx="9598176" cy="483700"/>
+            <a:ext cx="9598176" cy="3392766"/>
           </a:xfrm>
           <a:prstGeom prst="rect">
             <a:avLst/>
@@ -5789,26 +6361,13 @@
               </a:lnSpc>
             </a:pPr>
             <a:r>
-              <a:rPr lang="en-US" sz="2400" dirty="0">
+              <a:rPr lang="en-US" sz="2800" dirty="0">
                 <a:effectLst/>
                 <a:latin typeface="Quattrocento Sans" panose="020B0502050000020003" pitchFamily="34" charset="0"/>
                 <a:cs typeface="Arial" pitchFamily="34" charset="0"/>
               </a:rPr>
-              <a:t>This is </a:t>
-            </a:r>
-            <a:r>
-              <a:rPr lang="en-US" sz="2400">
-                <a:effectLst/>
-                <a:latin typeface="Quattrocento Sans" panose="020B0502050000020003" pitchFamily="34" charset="0"/>
-                <a:cs typeface="Arial" pitchFamily="34" charset="0"/>
-              </a:rPr>
-              <a:t>a conclusion</a:t>
-            </a:r>
-            <a:endParaRPr lang="en-US" sz="2400" dirty="0">
-              <a:effectLst/>
-              <a:latin typeface="Quattrocento Sans" panose="020B0502050000020003" pitchFamily="34" charset="0"/>
-              <a:cs typeface="Arial" pitchFamily="34" charset="0"/>
-            </a:endParaRPr>
+              <a:t>The use of a neural network over a linear regression offers several key advantages, which has been illustrated by the application here. It can model complex, non-linear relationships between variables, handle large amounts of data, and improve over time. These advantages make neural networks a valuable tool for making accurate predictions in the California housing market.</a:t>
+            </a:r>
           </a:p>
         </p:txBody>
       </p:sp>
@@ -6879,6 +7438,36 @@
           <a:xfrm>
             <a:off x="22546635" y="9814072"/>
             <a:ext cx="7407586" cy="3482771"/>
+          </a:xfrm>
+          <a:prstGeom prst="rect">
+            <a:avLst/>
+          </a:prstGeom>
+        </p:spPr>
+      </p:pic>
+      <p:pic>
+        <p:nvPicPr>
+          <p:cNvPr id="4" name="Picture 3">
+            <a:extLst>
+              <a:ext uri="{FF2B5EF4-FFF2-40B4-BE49-F238E27FC236}">
+                <a16:creationId xmlns:a16="http://schemas.microsoft.com/office/drawing/2014/main" id="{DC99F6B9-8A62-843F-A71B-157133F9A7F3}"/>
+              </a:ext>
+            </a:extLst>
+          </p:cNvPr>
+          <p:cNvPicPr>
+            <a:picLocks noChangeAspect="1"/>
+          </p:cNvPicPr>
+          <p:nvPr/>
+        </p:nvPicPr>
+        <p:blipFill>
+          <a:blip r:embed="rId4"/>
+          <a:stretch>
+            <a:fillRect/>
+          </a:stretch>
+        </p:blipFill>
+        <p:spPr>
+          <a:xfrm>
+            <a:off x="22560489" y="18026062"/>
+            <a:ext cx="4419600" cy="4333875"/>
           </a:xfrm>
           <a:prstGeom prst="rect">
             <a:avLst/>
@@ -8148,6 +8737,15 @@
 </file>
 
 <file path=customXml/item1.xml><?xml version="1.0" encoding="utf-8"?>
+<?mso-contentType ?>
+<FormTemplates xmlns="http://schemas.microsoft.com/sharepoint/v3/contenttype/forms">
+  <Display>DocumentLibraryForm</Display>
+  <Edit>DocumentLibraryForm</Edit>
+  <New>DocumentLibraryForm</New>
+</FormTemplates>
+</file>
+
+<file path=customXml/item2.xml><?xml version="1.0" encoding="utf-8"?>
 <ct:contentTypeSchema xmlns:ct="http://schemas.microsoft.com/office/2006/metadata/contentType" xmlns:ma="http://schemas.microsoft.com/office/2006/metadata/properties/metaAttributes" ct:_="" ma:_="" ma:contentTypeName="Document" ma:contentTypeID="0x010100F5D660F3FC1E7C408E16390F9942761A" ma:contentTypeVersion="14" ma:contentTypeDescription="Create a new document." ma:contentTypeScope="" ma:versionID="c45749503bc0b2e47856fc05f642e850">
   <xsd:schema xmlns:xsd="http://www.w3.org/2001/XMLSchema" xmlns:xs="http://www.w3.org/2001/XMLSchema" xmlns:p="http://schemas.microsoft.com/office/2006/metadata/properties" xmlns:ns3="cb290d18-a6bb-4986-8cd8-a2fc19ebc901" xmlns:ns4="c08b6b52-cd5f-4467-8eb8-47e70e31f32d" targetNamespace="http://schemas.microsoft.com/office/2006/metadata/properties" ma:root="true" ma:fieldsID="053826f8d6ac9b46a517f96eff622063" ns3:_="" ns4:_="">
     <xsd:import namespace="cb290d18-a6bb-4986-8cd8-a2fc19ebc901"/>
@@ -8376,15 +8974,6 @@
 </ct:contentTypeSchema>
 </file>
 
-<file path=customXml/item2.xml><?xml version="1.0" encoding="utf-8"?>
-<?mso-contentType ?>
-<FormTemplates xmlns="http://schemas.microsoft.com/sharepoint/v3/contenttype/forms">
-  <Display>DocumentLibraryForm</Display>
-  <Edit>DocumentLibraryForm</Edit>
-  <New>DocumentLibraryForm</New>
-</FormTemplates>
-</file>
-
 <file path=customXml/item3.xml><?xml version="1.0" encoding="utf-8"?>
 <p:properties xmlns:p="http://schemas.microsoft.com/office/2006/metadata/properties" xmlns:xsi="http://www.w3.org/2001/XMLSchema-instance" xmlns:pc="http://schemas.microsoft.com/office/infopath/2007/PartnerControls">
   <documentManagement/>
@@ -8392,6 +8981,14 @@
 </file>
 
 <file path=customXml/itemProps1.xml><?xml version="1.0" encoding="utf-8"?>
+<ds:datastoreItem xmlns:ds="http://schemas.openxmlformats.org/officeDocument/2006/customXml" ds:itemID="{DB660E73-876B-428D-8490-3250031BCA46}">
+  <ds:schemaRefs>
+    <ds:schemaRef ds:uri="http://schemas.microsoft.com/sharepoint/v3/contenttype/forms"/>
+  </ds:schemaRefs>
+</ds:datastoreItem>
+</file>
+
+<file path=customXml/itemProps2.xml><?xml version="1.0" encoding="utf-8"?>
 <ds:datastoreItem xmlns:ds="http://schemas.openxmlformats.org/officeDocument/2006/customXml" ds:itemID="{33996F9C-ED23-4E7F-899A-CF0FC53306DF}">
   <ds:schemaRefs>
     <ds:schemaRef ds:uri="http://schemas.microsoft.com/office/2006/metadata/contentType"/>
@@ -8406,14 +9003,6 @@
     <ds:schemaRef ds:uri="http://purl.org/dc/elements/1.1/"/>
     <ds:schemaRef ds:uri="http://purl.org/dc/terms/"/>
     <ds:schemaRef ds:uri="http://schemas.microsoft.com/internal/obd"/>
-  </ds:schemaRefs>
-</ds:datastoreItem>
-</file>
-
-<file path=customXml/itemProps2.xml><?xml version="1.0" encoding="utf-8"?>
-<ds:datastoreItem xmlns:ds="http://schemas.openxmlformats.org/officeDocument/2006/customXml" ds:itemID="{DB660E73-876B-428D-8490-3250031BCA46}">
-  <ds:schemaRefs>
-    <ds:schemaRef ds:uri="http://schemas.microsoft.com/sharepoint/v3/contenttype/forms"/>
   </ds:schemaRefs>
 </ds:datastoreItem>
 </file>

</xml_diff>

<commit_message>
Added some work to slide
</commit_message>
<xml_diff>
--- a/C351 Presentation.pptx
+++ b/C351 Presentation.pptx
@@ -251,6 +251,99 @@
     </p:ext>
   </p:extLst>
 </p:presentation>
+</file>
+
+<file path=ppt/revisionInfo.xml><?xml version="1.0" encoding="utf-8"?>
+<p1510:revInfo xmlns:a="http://schemas.openxmlformats.org/drawingml/2006/main" xmlns:r="http://schemas.openxmlformats.org/officeDocument/2006/relationships" xmlns:p1510="http://schemas.microsoft.com/office/powerpoint/2015/10/main">
+  <p1510:revLst>
+    <p1510:client id="{EF1A4A9C-8E0F-1A40-BCC6-60B6B51C48CC}" v="6" dt="2022-12-10T22:54:38.411"/>
+  </p1510:revLst>
+</p1510:revInfo>
+</file>
+
+<file path=ppt/changesInfos/changesInfo1.xml><?xml version="1.0" encoding="utf-8"?>
+<pc:chgInfo xmlns:a="http://schemas.openxmlformats.org/drawingml/2006/main" xmlns:r="http://schemas.openxmlformats.org/officeDocument/2006/relationships" xmlns:ac="http://schemas.microsoft.com/office/drawing/2013/main/command" xmlns:pc="http://schemas.microsoft.com/office/powerpoint/2013/main/command">
+  <pc:docChgLst>
+    <pc:chgData name="Mervar, Alexander" userId="18262614-b438-4434-9d7d-b5d4e8ec746c" providerId="ADAL" clId="{EF1A4A9C-8E0F-1A40-BCC6-60B6B51C48CC}"/>
+    <pc:docChg chg="undo custSel modSld">
+      <pc:chgData name="Mervar, Alexander" userId="18262614-b438-4434-9d7d-b5d4e8ec746c" providerId="ADAL" clId="{EF1A4A9C-8E0F-1A40-BCC6-60B6B51C48CC}" dt="2022-12-10T23:00:12.522" v="118" actId="255"/>
+      <pc:docMkLst>
+        <pc:docMk/>
+      </pc:docMkLst>
+      <pc:sldChg chg="addSp delSp modSp mod">
+        <pc:chgData name="Mervar, Alexander" userId="18262614-b438-4434-9d7d-b5d4e8ec746c" providerId="ADAL" clId="{EF1A4A9C-8E0F-1A40-BCC6-60B6B51C48CC}" dt="2022-12-10T23:00:12.522" v="118" actId="255"/>
+        <pc:sldMkLst>
+          <pc:docMk/>
+          <pc:sldMk cId="0" sldId="256"/>
+        </pc:sldMkLst>
+        <pc:spChg chg="mod">
+          <ac:chgData name="Mervar, Alexander" userId="18262614-b438-4434-9d7d-b5d4e8ec746c" providerId="ADAL" clId="{EF1A4A9C-8E0F-1A40-BCC6-60B6B51C48CC}" dt="2022-12-10T22:56:38.669" v="56"/>
+          <ac:spMkLst>
+            <pc:docMk/>
+            <pc:sldMk cId="0" sldId="256"/>
+            <ac:spMk id="70" creationId="{425621FB-070F-446E-BA36-4A66EBF8DEF2}"/>
+          </ac:spMkLst>
+        </pc:spChg>
+        <pc:spChg chg="mod">
+          <ac:chgData name="Mervar, Alexander" userId="18262614-b438-4434-9d7d-b5d4e8ec746c" providerId="ADAL" clId="{EF1A4A9C-8E0F-1A40-BCC6-60B6B51C48CC}" dt="2022-12-10T22:59:56.678" v="116" actId="20577"/>
+          <ac:spMkLst>
+            <pc:docMk/>
+            <pc:sldMk cId="0" sldId="256"/>
+            <ac:spMk id="80" creationId="{45A199C6-0BDE-461E-8044-A335463A4944}"/>
+          </ac:spMkLst>
+        </pc:spChg>
+        <pc:spChg chg="mod">
+          <ac:chgData name="Mervar, Alexander" userId="18262614-b438-4434-9d7d-b5d4e8ec746c" providerId="ADAL" clId="{EF1A4A9C-8E0F-1A40-BCC6-60B6B51C48CC}" dt="2022-12-10T22:56:05.264" v="51" actId="20577"/>
+          <ac:spMkLst>
+            <pc:docMk/>
+            <pc:sldMk cId="0" sldId="256"/>
+            <ac:spMk id="83" creationId="{16D6CE1D-7E3F-42CA-A7BD-5FA191CFE645}"/>
+          </ac:spMkLst>
+        </pc:spChg>
+        <pc:spChg chg="mod">
+          <ac:chgData name="Mervar, Alexander" userId="18262614-b438-4434-9d7d-b5d4e8ec746c" providerId="ADAL" clId="{EF1A4A9C-8E0F-1A40-BCC6-60B6B51C48CC}" dt="2022-12-10T22:59:24.091" v="106" actId="255"/>
+          <ac:spMkLst>
+            <pc:docMk/>
+            <pc:sldMk cId="0" sldId="256"/>
+            <ac:spMk id="86" creationId="{43D130FF-027B-433C-BF4F-A381B032C858}"/>
+          </ac:spMkLst>
+        </pc:spChg>
+        <pc:spChg chg="mod">
+          <ac:chgData name="Mervar, Alexander" userId="18262614-b438-4434-9d7d-b5d4e8ec746c" providerId="ADAL" clId="{EF1A4A9C-8E0F-1A40-BCC6-60B6B51C48CC}" dt="2022-12-10T23:00:12.522" v="118" actId="255"/>
+          <ac:spMkLst>
+            <pc:docMk/>
+            <pc:sldMk cId="0" sldId="256"/>
+            <ac:spMk id="92" creationId="{B4F3D693-DA0F-454D-94C0-CEAA07C14AE3}"/>
+          </ac:spMkLst>
+        </pc:spChg>
+        <pc:graphicFrameChg chg="add mod modGraphic">
+          <ac:chgData name="Mervar, Alexander" userId="18262614-b438-4434-9d7d-b5d4e8ec746c" providerId="ADAL" clId="{EF1A4A9C-8E0F-1A40-BCC6-60B6B51C48CC}" dt="2022-12-10T22:55:41.889" v="39" actId="1076"/>
+          <ac:graphicFrameMkLst>
+            <pc:docMk/>
+            <pc:sldMk cId="0" sldId="256"/>
+            <ac:graphicFrameMk id="2" creationId="{3E96C97E-5CE0-45C7-826D-264BD9B5BA0F}"/>
+          </ac:graphicFrameMkLst>
+        </pc:graphicFrameChg>
+        <pc:picChg chg="del mod">
+          <ac:chgData name="Mervar, Alexander" userId="18262614-b438-4434-9d7d-b5d4e8ec746c" providerId="ADAL" clId="{EF1A4A9C-8E0F-1A40-BCC6-60B6B51C48CC}" dt="2022-12-10T22:52:48.328" v="1" actId="478"/>
+          <ac:picMkLst>
+            <pc:docMk/>
+            <pc:sldMk cId="0" sldId="256"/>
+            <ac:picMk id="3" creationId="{FD3745ED-FE05-F1CC-4217-7B845B641E97}"/>
+          </ac:picMkLst>
+        </pc:picChg>
+        <pc:picChg chg="mod">
+          <ac:chgData name="Mervar, Alexander" userId="18262614-b438-4434-9d7d-b5d4e8ec746c" providerId="ADAL" clId="{EF1A4A9C-8E0F-1A40-BCC6-60B6B51C48CC}" dt="2022-12-10T22:56:02.509" v="48" actId="1076"/>
+          <ac:picMkLst>
+            <pc:docMk/>
+            <pc:sldMk cId="0" sldId="256"/>
+            <ac:picMk id="4" creationId="{DC99F6B9-8A62-843F-A71B-157133F9A7F3}"/>
+          </ac:picMkLst>
+        </pc:picChg>
+      </pc:sldChg>
+    </pc:docChg>
+  </pc:docChgLst>
+</pc:chgInfo>
 </file>
 
 <file path=ppt/handoutMasters/handoutMaster1.xml><?xml version="1.0" encoding="utf-8"?>
@@ -3943,7 +4036,7 @@
                 <a:effectLst/>
                 <a:latin typeface="Quattrocento" panose="02020802030000000404" pitchFamily="18" charset="0"/>
               </a:rPr>
-              <a:t>Draft Technical Presentation Working Title</a:t>
+              <a:t>Using Neural Networks To Predict the California Housing Market </a:t>
             </a:r>
           </a:p>
         </p:txBody>
@@ -4519,7 +4612,7 @@
         <p:spPr bwMode="auto">
           <a:xfrm>
             <a:off x="11718614" y="8610600"/>
-            <a:ext cx="9598176" cy="15786351"/>
+            <a:ext cx="9598176" cy="24182495"/>
           </a:xfrm>
           <a:prstGeom prst="rect">
             <a:avLst/>
@@ -4689,8 +4782,21 @@
                 <a:latin typeface="Quattrocento Sans" panose="020B0502050000020003" pitchFamily="34" charset="0"/>
                 <a:cs typeface="Arial" pitchFamily="34" charset="0"/>
               </a:rPr>
-              <a:t>	The original dataset contained categorical values to express the distance of the given neighborhood from the coast. We applied one-hot encoding to extract these values to individual features. One-hot encoding was chosen to reduce bias introduced by other methods (Original encoding, Hashing). Another method employed to reduce bias was standardization. Because the ranges between the numerical values in the original data were high, we believed our neural model performance could be improved by scaling the values. We also applied mean imputation to estimate missing data.</a:t>
-            </a:r>
+              <a:t>	</a:t>
+            </a:r>
+            <a:r>
+              <a:rPr lang="en-US" sz="3200" dirty="0">
+                <a:effectLst/>
+                <a:latin typeface="Quattrocento Sans" panose="020B0502050000020003" pitchFamily="34" charset="0"/>
+                <a:cs typeface="Arial" pitchFamily="34" charset="0"/>
+              </a:rPr>
+              <a:t>The original dataset contained categorical values to express the distance of the given neighborhood from the coast. We applied one-hot encoding to extract these values to individual features. One-hot encoding was chosen to reduce bias introduced by other methods (Original encoding, Hashing). Another method employed to reduce bias was standardization. Because the ranges between the numerical values in the original data were high, we believed our neural model performance could be improved by scaling the values. We also applied mean imputation to estimate missing data.</a:t>
+            </a:r>
+            <a:endParaRPr lang="en-US" sz="2400" dirty="0">
+              <a:effectLst/>
+              <a:latin typeface="Quattrocento Sans" panose="020B0502050000020003" pitchFamily="34" charset="0"/>
+              <a:cs typeface="Arial" pitchFamily="34" charset="0"/>
+            </a:endParaRPr>
           </a:p>
           <a:p>
             <a:pPr algn="just">
@@ -4717,6 +4823,18 @@
             </a:endParaRPr>
           </a:p>
           <a:p>
+            <a:pPr algn="just">
+              <a:lnSpc>
+                <a:spcPct val="110000"/>
+              </a:lnSpc>
+            </a:pPr>
+            <a:endParaRPr lang="en-US" sz="2400" dirty="0">
+              <a:effectLst/>
+              <a:latin typeface="Quattrocento Sans" panose="020B0502050000020003" pitchFamily="34" charset="0"/>
+              <a:cs typeface="Arial" pitchFamily="34" charset="0"/>
+            </a:endParaRPr>
+          </a:p>
+          <a:p>
             <a:pPr marL="0" marR="0" lvl="0" indent="0" algn="just" defTabSz="914400" rtl="0" eaLnBrk="0" fontAlgn="base" latinLnBrk="0" hangingPunct="0">
               <a:lnSpc>
                 <a:spcPct val="110000"/>
@@ -4750,14 +4868,36 @@
               </a:rPr>
               <a:t>Linear Regression</a:t>
             </a:r>
-            <a:endParaRPr lang="en-US" sz="3600" dirty="0">
-              <a:solidFill>
-                <a:prstClr val="black"/>
-              </a:solidFill>
-              <a:effectLst/>
-              <a:latin typeface="Quattrocento Sans" panose="020B0502050000020003" pitchFamily="34" charset="0"/>
-              <a:cs typeface="Arial" pitchFamily="34" charset="0"/>
-            </a:endParaRPr>
+          </a:p>
+          <a:p>
+            <a:pPr algn="just">
+              <a:lnSpc>
+                <a:spcPct val="110000"/>
+              </a:lnSpc>
+              <a:defRPr/>
+            </a:pPr>
+            <a:r>
+              <a:rPr lang="en-US" sz="3600" dirty="0">
+                <a:solidFill>
+                  <a:prstClr val="black"/>
+                </a:solidFill>
+                <a:effectLst/>
+                <a:latin typeface="Quattrocento Sans" panose="020B0502050000020003" pitchFamily="34" charset="0"/>
+                <a:cs typeface="Arial" pitchFamily="34" charset="0"/>
+              </a:rPr>
+              <a:t>	</a:t>
+            </a:r>
+            <a:r>
+              <a:rPr lang="en-US" sz="3200" dirty="0">
+                <a:solidFill>
+                  <a:prstClr val="black"/>
+                </a:solidFill>
+                <a:effectLst/>
+                <a:latin typeface="Quattrocento Sans" panose="020B0502050000020003" pitchFamily="34" charset="0"/>
+                <a:cs typeface="Arial" pitchFamily="34" charset="0"/>
+              </a:rPr>
+              <a:t>Linear regression is a statistical method that is often used to model the relationship between a dependent variable and one or more independent variables. In the context of the housing market, linear regression could be used to predict the value of a house based on factors such as its location, size, age, and other characteristics. </a:t>
+            </a:r>
           </a:p>
           <a:p>
             <a:pPr marL="0" marR="0" lvl="0" indent="0" algn="just" defTabSz="914400" rtl="0" eaLnBrk="0" fontAlgn="base" latinLnBrk="0" hangingPunct="0">
@@ -4778,7 +4918,7 @@
               <a:defRPr/>
             </a:pPr>
             <a:r>
-              <a:rPr kumimoji="0" lang="en-US" sz="2800" b="0" i="0" u="none" strike="noStrike" kern="1200" cap="none" spc="0" normalizeH="0" baseline="0" noProof="0" dirty="0">
+              <a:rPr kumimoji="0" lang="en-US" sz="3200" b="0" i="0" u="none" strike="noStrike" kern="1200" cap="none" spc="0" normalizeH="0" baseline="0" noProof="0" dirty="0">
                 <a:ln>
                   <a:noFill/>
                 </a:ln>
@@ -4794,7 +4934,7 @@
               <a:t>	To test the validity of our neural network it was essential to create a linear regression to act as the baseline for comparison. By using Python packages pandas and </a:t>
             </a:r>
             <a:r>
-              <a:rPr kumimoji="0" lang="en-US" sz="2800" b="0" i="0" u="none" strike="noStrike" kern="1200" cap="none" spc="0" normalizeH="0" baseline="0" noProof="0" dirty="0" err="1">
+              <a:rPr kumimoji="0" lang="en-US" sz="3200" b="0" i="0" u="none" strike="noStrike" kern="1200" cap="none" spc="0" normalizeH="0" baseline="0" noProof="0" dirty="0" err="1">
                 <a:ln>
                   <a:noFill/>
                 </a:ln>
@@ -4810,7 +4950,7 @@
               <a:t>statsmodels</a:t>
             </a:r>
             <a:r>
-              <a:rPr kumimoji="0" lang="en-US" sz="2800" b="0" i="0" u="none" strike="noStrike" kern="1200" cap="none" spc="0" normalizeH="0" baseline="0" noProof="0" dirty="0">
+              <a:rPr kumimoji="0" lang="en-US" sz="3200" b="0" i="0" u="none" strike="noStrike" kern="1200" cap="none" spc="0" normalizeH="0" baseline="0" noProof="0" dirty="0">
                 <a:ln>
                   <a:noFill/>
                 </a:ln>
@@ -4826,7 +4966,7 @@
               <a:t>, we were able to fit the variables of the dataset to the "</a:t>
             </a:r>
             <a:r>
-              <a:rPr kumimoji="0" lang="en-US" sz="2800" b="0" i="0" u="none" strike="noStrike" kern="1200" cap="none" spc="0" normalizeH="0" baseline="0" noProof="0" dirty="0" err="1">
+              <a:rPr kumimoji="0" lang="en-US" sz="3200" b="0" i="0" u="none" strike="noStrike" kern="1200" cap="none" spc="0" normalizeH="0" baseline="0" noProof="0" dirty="0" err="1">
                 <a:ln>
                   <a:noFill/>
                 </a:ln>
@@ -4842,7 +4982,7 @@
               <a:t>median_house_value</a:t>
             </a:r>
             <a:r>
-              <a:rPr kumimoji="0" lang="en-US" sz="2800" b="0" i="0" u="none" strike="noStrike" kern="1200" cap="none" spc="0" normalizeH="0" baseline="0" noProof="0" dirty="0">
+              <a:rPr kumimoji="0" lang="en-US" sz="3200" b="0" i="0" u="none" strike="noStrike" kern="1200" cap="none" spc="0" normalizeH="0" baseline="0" noProof="0" dirty="0">
                 <a:ln>
                   <a:noFill/>
                 </a:ln>
@@ -4855,23 +4995,7 @@
                 <a:latin typeface="Quattrocento Sans" panose="020B0502050000020003" pitchFamily="34" charset="0"/>
                 <a:cs typeface="Arial" pitchFamily="34" charset="0"/>
               </a:rPr>
-              <a:t>" variable using a standard linear regression method</a:t>
-            </a:r>
-            <a:r>
-              <a:rPr kumimoji="0" lang="en-US" sz="3200" b="0" i="0" u="none" strike="noStrike" kern="1200" cap="none" spc="0" normalizeH="0" baseline="0" noProof="0" dirty="0">
-                <a:ln>
-                  <a:noFill/>
-                </a:ln>
-                <a:solidFill>
-                  <a:prstClr val="black"/>
-                </a:solidFill>
-                <a:effectLst/>
-                <a:uLnTx/>
-                <a:uFillTx/>
-                <a:latin typeface="Quattrocento Sans" panose="020B0502050000020003" pitchFamily="34" charset="0"/>
-                <a:cs typeface="Arial" pitchFamily="34" charset="0"/>
-              </a:rPr>
-              <a:t>.</a:t>
+              <a:t>" variable using a standard linear regression method.</a:t>
             </a:r>
           </a:p>
           <a:p>
@@ -4946,6 +5070,33 @@
               <a:tabLst/>
               <a:defRPr/>
             </a:pPr>
+            <a:endParaRPr lang="en-US" sz="2400" dirty="0">
+              <a:solidFill>
+                <a:prstClr val="black"/>
+              </a:solidFill>
+              <a:effectLst/>
+              <a:latin typeface="Quattrocento Sans" panose="020B0502050000020003" pitchFamily="34" charset="0"/>
+              <a:cs typeface="Arial" pitchFamily="34" charset="0"/>
+            </a:endParaRPr>
+          </a:p>
+          <a:p>
+            <a:pPr marL="0" marR="0" lvl="0" indent="0" algn="just" defTabSz="914400" rtl="0" eaLnBrk="0" fontAlgn="base" latinLnBrk="0" hangingPunct="0">
+              <a:lnSpc>
+                <a:spcPct val="110000"/>
+              </a:lnSpc>
+              <a:spcBef>
+                <a:spcPct val="0"/>
+              </a:spcBef>
+              <a:spcAft>
+                <a:spcPct val="0"/>
+              </a:spcAft>
+              <a:buClrTx/>
+              <a:buSzTx/>
+              <a:buFontTx/>
+              <a:buNone/>
+              <a:tabLst/>
+              <a:defRPr/>
+            </a:pPr>
             <a:r>
               <a:rPr lang="en-US" sz="3600" dirty="0">
                 <a:effectLst/>
@@ -4974,7 +5125,7 @@
               </a:lnSpc>
             </a:pPr>
             <a:r>
-              <a:rPr lang="en-US" sz="2800" dirty="0">
+              <a:rPr lang="en-US" sz="3200" dirty="0">
                 <a:effectLst/>
                 <a:latin typeface="Quattrocento Sans" panose="020B0502050000020003" pitchFamily="34" charset="0"/>
                 <a:cs typeface="Arial" pitchFamily="34" charset="0"/>
@@ -5128,7 +5279,7 @@
         <p:spPr bwMode="auto">
           <a:xfrm>
             <a:off x="22546635" y="8610600"/>
-            <a:ext cx="9598176" cy="18602571"/>
+            <a:ext cx="9598176" cy="22394378"/>
           </a:xfrm>
           <a:prstGeom prst="rect">
             <a:avLst/>
@@ -5705,22 +5856,14 @@
               <a:tabLst/>
               <a:defRPr/>
             </a:pPr>
-            <a:r>
-              <a:rPr kumimoji="0" lang="en-US" sz="3600" b="0" i="0" u="none" strike="noStrike" kern="1200" cap="none" spc="0" normalizeH="0" baseline="0" noProof="0" dirty="0">
-                <a:ln>
-                  <a:noFill/>
-                </a:ln>
-                <a:solidFill>
-                  <a:prstClr val="black"/>
-                </a:solidFill>
-                <a:effectLst/>
-                <a:uLnTx/>
-                <a:uFillTx/>
-                <a:latin typeface="Quattrocento Sans" panose="020B0502050000020003" pitchFamily="34" charset="0"/>
-                <a:cs typeface="Arial" pitchFamily="34" charset="0"/>
-              </a:rPr>
-              <a:t>Neural Network Results</a:t>
-            </a:r>
+            <a:endParaRPr lang="en-US" sz="3600" dirty="0">
+              <a:solidFill>
+                <a:prstClr val="black"/>
+              </a:solidFill>
+              <a:effectLst/>
+              <a:latin typeface="Quattrocento Sans" panose="020B0502050000020003" pitchFamily="34" charset="0"/>
+              <a:cs typeface="Arial" pitchFamily="34" charset="0"/>
+            </a:endParaRPr>
           </a:p>
           <a:p>
             <a:pPr marL="0" marR="0" lvl="0" indent="0" algn="just" defTabSz="914400" rtl="0" eaLnBrk="0" fontAlgn="base" latinLnBrk="0" hangingPunct="0">
@@ -5772,6 +5915,22 @@
               <a:tabLst/>
               <a:defRPr/>
             </a:pPr>
+            <a:r>
+              <a:rPr kumimoji="0" lang="en-US" sz="3600" b="0" i="0" u="none" strike="noStrike" kern="1200" cap="none" spc="0" normalizeH="0" baseline="0" noProof="0" dirty="0">
+                <a:ln>
+                  <a:noFill/>
+                </a:ln>
+                <a:solidFill>
+                  <a:prstClr val="black"/>
+                </a:solidFill>
+                <a:effectLst/>
+                <a:uLnTx/>
+                <a:uFillTx/>
+                <a:latin typeface="Quattrocento Sans" panose="020B0502050000020003" pitchFamily="34" charset="0"/>
+                <a:cs typeface="Arial" pitchFamily="34" charset="0"/>
+              </a:rPr>
+              <a:t>Neural Network Results</a:t>
+            </a:r>
             <a:endParaRPr lang="en-US" sz="3600" dirty="0">
               <a:solidFill>
                 <a:prstClr val="black"/>
@@ -5959,6 +6118,247 @@
               <a:effectLst/>
               <a:uLnTx/>
               <a:uFillTx/>
+              <a:latin typeface="Quattrocento Sans" panose="020B0502050000020003" pitchFamily="34" charset="0"/>
+              <a:cs typeface="Arial" pitchFamily="34" charset="0"/>
+            </a:endParaRPr>
+          </a:p>
+          <a:p>
+            <a:pPr marL="0" marR="0" lvl="0" indent="0" algn="just" defTabSz="914400" rtl="0" eaLnBrk="0" fontAlgn="base" latinLnBrk="0" hangingPunct="0">
+              <a:lnSpc>
+                <a:spcPct val="110000"/>
+              </a:lnSpc>
+              <a:spcBef>
+                <a:spcPct val="0"/>
+              </a:spcBef>
+              <a:spcAft>
+                <a:spcPct val="0"/>
+              </a:spcAft>
+              <a:buClrTx/>
+              <a:buSzTx/>
+              <a:buFontTx/>
+              <a:buNone/>
+              <a:tabLst/>
+              <a:defRPr/>
+            </a:pPr>
+            <a:endParaRPr kumimoji="0" lang="en-US" sz="2800" b="0" i="0" u="none" strike="noStrike" kern="1200" cap="none" spc="0" normalizeH="0" baseline="0" noProof="0" dirty="0">
+              <a:ln>
+                <a:noFill/>
+              </a:ln>
+              <a:solidFill>
+                <a:prstClr val="black"/>
+              </a:solidFill>
+              <a:effectLst/>
+              <a:uLnTx/>
+              <a:uFillTx/>
+              <a:latin typeface="Quattrocento Sans" panose="020B0502050000020003" pitchFamily="34" charset="0"/>
+              <a:cs typeface="Arial" pitchFamily="34" charset="0"/>
+            </a:endParaRPr>
+          </a:p>
+          <a:p>
+            <a:pPr marL="0" marR="0" lvl="0" indent="0" algn="just" defTabSz="914400" rtl="0" eaLnBrk="0" fontAlgn="base" latinLnBrk="0" hangingPunct="0">
+              <a:lnSpc>
+                <a:spcPct val="110000"/>
+              </a:lnSpc>
+              <a:spcBef>
+                <a:spcPct val="0"/>
+              </a:spcBef>
+              <a:spcAft>
+                <a:spcPct val="0"/>
+              </a:spcAft>
+              <a:buClrTx/>
+              <a:buSzTx/>
+              <a:buFontTx/>
+              <a:buNone/>
+              <a:tabLst/>
+              <a:defRPr/>
+            </a:pPr>
+            <a:endParaRPr kumimoji="0" lang="en-US" sz="2800" b="0" i="0" u="none" strike="noStrike" kern="1200" cap="none" spc="0" normalizeH="0" baseline="0" noProof="0" dirty="0">
+              <a:ln>
+                <a:noFill/>
+              </a:ln>
+              <a:solidFill>
+                <a:prstClr val="black"/>
+              </a:solidFill>
+              <a:effectLst/>
+              <a:uLnTx/>
+              <a:uFillTx/>
+              <a:latin typeface="Quattrocento Sans" panose="020B0502050000020003" pitchFamily="34" charset="0"/>
+              <a:cs typeface="Arial" pitchFamily="34" charset="0"/>
+            </a:endParaRPr>
+          </a:p>
+          <a:p>
+            <a:pPr marL="0" marR="0" lvl="0" indent="0" algn="just" defTabSz="914400" rtl="0" eaLnBrk="0" fontAlgn="base" latinLnBrk="0" hangingPunct="0">
+              <a:lnSpc>
+                <a:spcPct val="110000"/>
+              </a:lnSpc>
+              <a:spcBef>
+                <a:spcPct val="0"/>
+              </a:spcBef>
+              <a:spcAft>
+                <a:spcPct val="0"/>
+              </a:spcAft>
+              <a:buClrTx/>
+              <a:buSzTx/>
+              <a:buFontTx/>
+              <a:buNone/>
+              <a:tabLst/>
+              <a:defRPr/>
+            </a:pPr>
+            <a:endParaRPr lang="en-US" sz="2800" dirty="0">
+              <a:solidFill>
+                <a:prstClr val="black"/>
+              </a:solidFill>
+              <a:effectLst/>
+              <a:latin typeface="Quattrocento Sans" panose="020B0502050000020003" pitchFamily="34" charset="0"/>
+              <a:cs typeface="Arial" pitchFamily="34" charset="0"/>
+            </a:endParaRPr>
+          </a:p>
+          <a:p>
+            <a:pPr marL="0" marR="0" lvl="0" indent="0" algn="just" defTabSz="914400" rtl="0" eaLnBrk="0" fontAlgn="base" latinLnBrk="0" hangingPunct="0">
+              <a:lnSpc>
+                <a:spcPct val="110000"/>
+              </a:lnSpc>
+              <a:spcBef>
+                <a:spcPct val="0"/>
+              </a:spcBef>
+              <a:spcAft>
+                <a:spcPct val="0"/>
+              </a:spcAft>
+              <a:buClrTx/>
+              <a:buSzTx/>
+              <a:buFontTx/>
+              <a:buNone/>
+              <a:tabLst/>
+              <a:defRPr/>
+            </a:pPr>
+            <a:endParaRPr kumimoji="0" lang="en-US" sz="2800" b="0" i="0" u="none" strike="noStrike" kern="1200" cap="none" spc="0" normalizeH="0" baseline="0" noProof="0" dirty="0">
+              <a:ln>
+                <a:noFill/>
+              </a:ln>
+              <a:solidFill>
+                <a:prstClr val="black"/>
+              </a:solidFill>
+              <a:effectLst/>
+              <a:uLnTx/>
+              <a:uFillTx/>
+              <a:latin typeface="Quattrocento Sans" panose="020B0502050000020003" pitchFamily="34" charset="0"/>
+              <a:cs typeface="Arial" pitchFamily="34" charset="0"/>
+            </a:endParaRPr>
+          </a:p>
+          <a:p>
+            <a:pPr marL="0" marR="0" lvl="0" indent="0" algn="just" defTabSz="914400" rtl="0" eaLnBrk="0" fontAlgn="base" latinLnBrk="0" hangingPunct="0">
+              <a:lnSpc>
+                <a:spcPct val="110000"/>
+              </a:lnSpc>
+              <a:spcBef>
+                <a:spcPct val="0"/>
+              </a:spcBef>
+              <a:spcAft>
+                <a:spcPct val="0"/>
+              </a:spcAft>
+              <a:buClrTx/>
+              <a:buSzTx/>
+              <a:buFontTx/>
+              <a:buNone/>
+              <a:tabLst/>
+              <a:defRPr/>
+            </a:pPr>
+            <a:endParaRPr lang="en-US" sz="2800" dirty="0">
+              <a:solidFill>
+                <a:prstClr val="black"/>
+              </a:solidFill>
+              <a:effectLst/>
+              <a:latin typeface="Quattrocento Sans" panose="020B0502050000020003" pitchFamily="34" charset="0"/>
+              <a:cs typeface="Arial" pitchFamily="34" charset="0"/>
+            </a:endParaRPr>
+          </a:p>
+          <a:p>
+            <a:pPr marL="0" marR="0" lvl="0" indent="0" algn="just" defTabSz="914400" rtl="0" eaLnBrk="0" fontAlgn="base" latinLnBrk="0" hangingPunct="0">
+              <a:lnSpc>
+                <a:spcPct val="110000"/>
+              </a:lnSpc>
+              <a:spcBef>
+                <a:spcPct val="0"/>
+              </a:spcBef>
+              <a:spcAft>
+                <a:spcPct val="0"/>
+              </a:spcAft>
+              <a:buClrTx/>
+              <a:buSzTx/>
+              <a:buFontTx/>
+              <a:buNone/>
+              <a:tabLst/>
+              <a:defRPr/>
+            </a:pPr>
+            <a:endParaRPr kumimoji="0" lang="en-US" sz="2800" b="0" i="0" u="none" strike="noStrike" kern="1200" cap="none" spc="0" normalizeH="0" baseline="0" noProof="0" dirty="0">
+              <a:ln>
+                <a:noFill/>
+              </a:ln>
+              <a:solidFill>
+                <a:prstClr val="black"/>
+              </a:solidFill>
+              <a:effectLst/>
+              <a:uLnTx/>
+              <a:uFillTx/>
+              <a:latin typeface="Quattrocento Sans" panose="020B0502050000020003" pitchFamily="34" charset="0"/>
+              <a:cs typeface="Arial" pitchFamily="34" charset="0"/>
+            </a:endParaRPr>
+          </a:p>
+          <a:p>
+            <a:pPr marL="0" marR="0" lvl="0" indent="0" algn="just" defTabSz="914400" rtl="0" eaLnBrk="0" fontAlgn="base" latinLnBrk="0" hangingPunct="0">
+              <a:lnSpc>
+                <a:spcPct val="110000"/>
+              </a:lnSpc>
+              <a:spcBef>
+                <a:spcPct val="0"/>
+              </a:spcBef>
+              <a:spcAft>
+                <a:spcPct val="0"/>
+              </a:spcAft>
+              <a:buClrTx/>
+              <a:buSzTx/>
+              <a:buFontTx/>
+              <a:buNone/>
+              <a:tabLst/>
+              <a:defRPr/>
+            </a:pPr>
+            <a:endParaRPr kumimoji="0" lang="en-US" sz="2800" b="0" i="0" u="none" strike="noStrike" kern="1200" cap="none" spc="0" normalizeH="0" baseline="0" noProof="0" dirty="0">
+              <a:ln>
+                <a:noFill/>
+              </a:ln>
+              <a:solidFill>
+                <a:prstClr val="black"/>
+              </a:solidFill>
+              <a:effectLst/>
+              <a:uLnTx/>
+              <a:uFillTx/>
+              <a:latin typeface="Quattrocento Sans" panose="020B0502050000020003" pitchFamily="34" charset="0"/>
+              <a:cs typeface="Arial" pitchFamily="34" charset="0"/>
+            </a:endParaRPr>
+          </a:p>
+          <a:p>
+            <a:pPr marL="0" marR="0" lvl="0" indent="0" algn="just" defTabSz="914400" rtl="0" eaLnBrk="0" fontAlgn="base" latinLnBrk="0" hangingPunct="0">
+              <a:lnSpc>
+                <a:spcPct val="110000"/>
+              </a:lnSpc>
+              <a:spcBef>
+                <a:spcPct val="0"/>
+              </a:spcBef>
+              <a:spcAft>
+                <a:spcPct val="0"/>
+              </a:spcAft>
+              <a:buClrTx/>
+              <a:buSzTx/>
+              <a:buFontTx/>
+              <a:buNone/>
+              <a:tabLst/>
+              <a:defRPr/>
+            </a:pPr>
+            <a:endParaRPr lang="en-US" sz="2800" dirty="0">
+              <a:solidFill>
+                <a:prstClr val="black"/>
+              </a:solidFill>
+              <a:effectLst/>
               <a:latin typeface="Quattrocento Sans" panose="020B0502050000020003" pitchFamily="34" charset="0"/>
               <a:cs typeface="Arial" pitchFamily="34" charset="0"/>
             </a:endParaRPr>
@@ -6211,7 +6611,7 @@
         <p:spPr bwMode="auto">
           <a:xfrm>
             <a:off x="33374654" y="8610600"/>
-            <a:ext cx="9598176" cy="3392766"/>
+            <a:ext cx="9598176" cy="17406410"/>
           </a:xfrm>
           <a:prstGeom prst="rect">
             <a:avLst/>
@@ -6361,7 +6761,104 @@
               </a:lnSpc>
             </a:pPr>
             <a:r>
-              <a:rPr lang="en-US" sz="2800" dirty="0">
+              <a:rPr lang="en-US" sz="3200" dirty="0">
+                <a:effectLst/>
+                <a:latin typeface="Quattrocento Sans" panose="020B0502050000020003" pitchFamily="34" charset="0"/>
+                <a:cs typeface="Arial" pitchFamily="34" charset="0"/>
+              </a:rPr>
+              <a:t>When running the two models against one an- other, the linear regression scored an R2 score of 0.6738328671015846 and the neural network scored an R2 score of 0.816898481006914. </a:t>
+            </a:r>
+          </a:p>
+          <a:p>
+            <a:pPr algn="just">
+              <a:lnSpc>
+                <a:spcPct val="110000"/>
+              </a:lnSpc>
+            </a:pPr>
+            <a:endParaRPr lang="en-US" sz="3200" dirty="0">
+              <a:effectLst/>
+              <a:latin typeface="Quattrocento Sans" panose="020B0502050000020003" pitchFamily="34" charset="0"/>
+              <a:cs typeface="Arial" pitchFamily="34" charset="0"/>
+            </a:endParaRPr>
+          </a:p>
+          <a:p>
+            <a:pPr algn="just">
+              <a:lnSpc>
+                <a:spcPct val="110000"/>
+              </a:lnSpc>
+            </a:pPr>
+            <a:r>
+              <a:rPr lang="en-US" sz="3200" dirty="0">
+                <a:effectLst/>
+                <a:latin typeface="Quattrocento Sans" panose="020B0502050000020003" pitchFamily="34" charset="0"/>
+                <a:cs typeface="Arial" pitchFamily="34" charset="0"/>
+              </a:rPr>
+              <a:t>An R2 score, also known as the coefficient of determination, is a measure of the goodness of fit of a model, where a value of 0 indicates that the model does not explain any of the variance in the data, and a value of 1 indicates that the model perfectly explains the variance in the data. A linear regression model with an R2 score of 0.6738328671015846 means that the model ex- plains about 67% of the variance in the data. An R2 score of 0.816898481006914 for a neural network indicates that the model explains about 81% of the variance in the data. </a:t>
+            </a:r>
+          </a:p>
+          <a:p>
+            <a:pPr algn="just">
+              <a:lnSpc>
+                <a:spcPct val="110000"/>
+              </a:lnSpc>
+            </a:pPr>
+            <a:endParaRPr lang="en-US" sz="3200" dirty="0">
+              <a:effectLst/>
+              <a:latin typeface="Quattrocento Sans" panose="020B0502050000020003" pitchFamily="34" charset="0"/>
+              <a:cs typeface="Arial" pitchFamily="34" charset="0"/>
+            </a:endParaRPr>
+          </a:p>
+          <a:p>
+            <a:pPr algn="just">
+              <a:lnSpc>
+                <a:spcPct val="110000"/>
+              </a:lnSpc>
+            </a:pPr>
+            <a:r>
+              <a:rPr lang="en-US" sz="3200" dirty="0">
+                <a:effectLst/>
+                <a:latin typeface="Quattrocento Sans" panose="020B0502050000020003" pitchFamily="34" charset="0"/>
+                <a:cs typeface="Arial" pitchFamily="34" charset="0"/>
+              </a:rPr>
+              <a:t>Overall, while both a linear regression model and a neural network can be used for predictive modeling, a neural network generally has a higher capacity to model complex relationships in the data and make more accurate predictions, as demon- </a:t>
+            </a:r>
+            <a:r>
+              <a:rPr lang="en-US" sz="3200" dirty="0" err="1">
+                <a:effectLst/>
+                <a:latin typeface="Quattrocento Sans" panose="020B0502050000020003" pitchFamily="34" charset="0"/>
+                <a:cs typeface="Arial" pitchFamily="34" charset="0"/>
+              </a:rPr>
+              <a:t>strated</a:t>
+            </a:r>
+            <a:r>
+              <a:rPr lang="en-US" sz="3200" dirty="0">
+                <a:effectLst/>
+                <a:latin typeface="Quattrocento Sans" panose="020B0502050000020003" pitchFamily="34" charset="0"/>
+                <a:cs typeface="Arial" pitchFamily="34" charset="0"/>
+              </a:rPr>
+              <a:t> by its higher R2 score. </a:t>
+            </a:r>
+          </a:p>
+          <a:p>
+            <a:pPr algn="just">
+              <a:lnSpc>
+                <a:spcPct val="110000"/>
+              </a:lnSpc>
+            </a:pPr>
+            <a:endParaRPr lang="en-US" sz="3200" dirty="0">
+              <a:effectLst/>
+              <a:latin typeface="Quattrocento Sans" panose="020B0502050000020003" pitchFamily="34" charset="0"/>
+              <a:cs typeface="Arial" pitchFamily="34" charset="0"/>
+            </a:endParaRPr>
+          </a:p>
+          <a:p>
+            <a:pPr algn="just">
+              <a:lnSpc>
+                <a:spcPct val="110000"/>
+              </a:lnSpc>
+            </a:pPr>
+            <a:r>
+              <a:rPr lang="en-US" sz="3200" dirty="0">
                 <a:effectLst/>
                 <a:latin typeface="Quattrocento Sans" panose="020B0502050000020003" pitchFamily="34" charset="0"/>
                 <a:cs typeface="Arial" pitchFamily="34" charset="0"/>
@@ -6869,7 +7366,7 @@
         <p:spPr bwMode="auto">
           <a:xfrm>
             <a:off x="33377113" y="28041600"/>
-            <a:ext cx="9598176" cy="2519963"/>
+            <a:ext cx="9598176" cy="4140086"/>
           </a:xfrm>
           <a:prstGeom prst="rect">
             <a:avLst/>
@@ -7019,7 +7516,7 @@
               </a:lnSpc>
             </a:pPr>
             <a:r>
-              <a:rPr lang="en-US" sz="1600" dirty="0" err="1">
+              <a:rPr lang="en-US" sz="2400" dirty="0" err="1">
                 <a:effectLst/>
                 <a:latin typeface="Quattrocento Sans" panose="020B0502050000020003" pitchFamily="34" charset="0"/>
                 <a:cs typeface="Arial" pitchFamily="34" charset="0"/>
@@ -7027,7 +7524,7 @@
               <a:t>Jasmina</a:t>
             </a:r>
             <a:r>
-              <a:rPr lang="en-US" sz="1600" dirty="0">
+              <a:rPr lang="en-US" sz="2400" dirty="0">
                 <a:effectLst/>
                 <a:latin typeface="Quattrocento Sans" panose="020B0502050000020003" pitchFamily="34" charset="0"/>
                 <a:cs typeface="Arial" pitchFamily="34" charset="0"/>
@@ -7035,7 +7532,7 @@
               <a:t> </a:t>
             </a:r>
             <a:r>
-              <a:rPr lang="en-US" sz="1600" dirty="0" err="1">
+              <a:rPr lang="en-US" sz="2400" dirty="0" err="1">
                 <a:effectLst/>
                 <a:latin typeface="Quattrocento Sans" panose="020B0502050000020003" pitchFamily="34" charset="0"/>
                 <a:cs typeface="Arial" pitchFamily="34" charset="0"/>
@@ -7043,7 +7540,7 @@
               <a:t>Cetkovic</a:t>
             </a:r>
             <a:r>
-              <a:rPr lang="en-US" sz="1600" dirty="0">
+              <a:rPr lang="en-US" sz="2400" dirty="0">
                 <a:effectLst/>
                 <a:latin typeface="Quattrocento Sans" panose="020B0502050000020003" pitchFamily="34" charset="0"/>
                 <a:cs typeface="Arial" pitchFamily="34" charset="0"/>
@@ -7051,7 +7548,7 @@
               <a:t>, Slobodan </a:t>
             </a:r>
             <a:r>
-              <a:rPr lang="en-US" sz="1600" dirty="0" err="1">
+              <a:rPr lang="en-US" sz="2400" dirty="0" err="1">
                 <a:effectLst/>
                 <a:latin typeface="Quattrocento Sans" panose="020B0502050000020003" pitchFamily="34" charset="0"/>
                 <a:cs typeface="Arial" pitchFamily="34" charset="0"/>
@@ -7059,7 +7556,7 @@
               <a:t>Laki</a:t>
             </a:r>
             <a:r>
-              <a:rPr lang="en-US" sz="1600" dirty="0">
+              <a:rPr lang="en-US" sz="2400" dirty="0">
                 <a:effectLst/>
                 <a:latin typeface="Quattrocento Sans" panose="020B0502050000020003" pitchFamily="34" charset="0"/>
                 <a:cs typeface="Arial" pitchFamily="34" charset="0"/>
@@ -7067,7 +7564,7 @@
               <a:t> ́c, </a:t>
             </a:r>
             <a:r>
-              <a:rPr lang="en-US" sz="1600" dirty="0" err="1">
+              <a:rPr lang="en-US" sz="2400" dirty="0" err="1">
                 <a:effectLst/>
                 <a:latin typeface="Quattrocento Sans" panose="020B0502050000020003" pitchFamily="34" charset="0"/>
                 <a:cs typeface="Arial" pitchFamily="34" charset="0"/>
@@ -7075,7 +7572,7 @@
               <a:t>Marijana</a:t>
             </a:r>
             <a:r>
-              <a:rPr lang="en-US" sz="1600" dirty="0">
+              <a:rPr lang="en-US" sz="2400" dirty="0">
                 <a:effectLst/>
                 <a:latin typeface="Quattrocento Sans" panose="020B0502050000020003" pitchFamily="34" charset="0"/>
                 <a:cs typeface="Arial" pitchFamily="34" charset="0"/>
@@ -7083,7 +7580,7 @@
               <a:t> </a:t>
             </a:r>
             <a:r>
-              <a:rPr lang="en-US" sz="1600" dirty="0" err="1">
+              <a:rPr lang="en-US" sz="2400" dirty="0" err="1">
                 <a:effectLst/>
                 <a:latin typeface="Quattrocento Sans" panose="020B0502050000020003" pitchFamily="34" charset="0"/>
                 <a:cs typeface="Arial" pitchFamily="34" charset="0"/>
@@ -7091,7 +7588,7 @@
               <a:t>Lazarevska</a:t>
             </a:r>
             <a:r>
-              <a:rPr lang="en-US" sz="1600" dirty="0">
+              <a:rPr lang="en-US" sz="2400" dirty="0">
                 <a:effectLst/>
                 <a:latin typeface="Quattrocento Sans" panose="020B0502050000020003" pitchFamily="34" charset="0"/>
                 <a:cs typeface="Arial" pitchFamily="34" charset="0"/>
@@ -7099,7 +7596,7 @@
               <a:t>, </a:t>
             </a:r>
             <a:r>
-              <a:rPr lang="en-US" sz="1600" dirty="0" err="1">
+              <a:rPr lang="en-US" sz="2400" dirty="0" err="1">
                 <a:effectLst/>
                 <a:latin typeface="Quattrocento Sans" panose="020B0502050000020003" pitchFamily="34" charset="0"/>
                 <a:cs typeface="Arial" pitchFamily="34" charset="0"/>
@@ -7107,7 +7604,7 @@
               <a:t>Miloš</a:t>
             </a:r>
             <a:r>
-              <a:rPr lang="en-US" sz="1600" dirty="0">
+              <a:rPr lang="en-US" sz="2400" dirty="0">
                 <a:effectLst/>
                 <a:latin typeface="Quattrocento Sans" panose="020B0502050000020003" pitchFamily="34" charset="0"/>
                 <a:cs typeface="Arial" pitchFamily="34" charset="0"/>
@@ -7115,7 +7612,7 @@
               <a:t> </a:t>
             </a:r>
             <a:r>
-              <a:rPr lang="en-US" sz="1600" dirty="0" err="1">
+              <a:rPr lang="en-US" sz="2400" dirty="0" err="1">
                 <a:effectLst/>
                 <a:latin typeface="Quattrocento Sans" panose="020B0502050000020003" pitchFamily="34" charset="0"/>
                 <a:cs typeface="Arial" pitchFamily="34" charset="0"/>
@@ -7123,7 +7620,7 @@
               <a:t>Žarkovi</a:t>
             </a:r>
             <a:r>
-              <a:rPr lang="en-US" sz="1600" dirty="0">
+              <a:rPr lang="en-US" sz="2400" dirty="0">
                 <a:effectLst/>
                 <a:latin typeface="Quattrocento Sans" panose="020B0502050000020003" pitchFamily="34" charset="0"/>
                 <a:cs typeface="Arial" pitchFamily="34" charset="0"/>
@@ -7131,7 +7628,7 @@
               <a:t> ́c, </a:t>
             </a:r>
             <a:r>
-              <a:rPr lang="en-US" sz="1600" dirty="0" err="1">
+              <a:rPr lang="en-US" sz="2400" dirty="0" err="1">
                 <a:effectLst/>
                 <a:latin typeface="Quattrocento Sans" panose="020B0502050000020003" pitchFamily="34" charset="0"/>
                 <a:cs typeface="Arial" pitchFamily="34" charset="0"/>
@@ -7139,7 +7636,7 @@
               <a:t>Saša</a:t>
             </a:r>
             <a:r>
-              <a:rPr lang="en-US" sz="1600" dirty="0">
+              <a:rPr lang="en-US" sz="2400" dirty="0">
                 <a:effectLst/>
                 <a:latin typeface="Quattrocento Sans" panose="020B0502050000020003" pitchFamily="34" charset="0"/>
                 <a:cs typeface="Arial" pitchFamily="34" charset="0"/>
@@ -7147,7 +7644,7 @@
               <a:t> </a:t>
             </a:r>
             <a:r>
-              <a:rPr lang="en-US" sz="1600" dirty="0" err="1">
+              <a:rPr lang="en-US" sz="2400" dirty="0" err="1">
                 <a:effectLst/>
                 <a:latin typeface="Quattrocento Sans" panose="020B0502050000020003" pitchFamily="34" charset="0"/>
                 <a:cs typeface="Arial" pitchFamily="34" charset="0"/>
@@ -7155,7 +7652,7 @@
               <a:t>Vujoševi</a:t>
             </a:r>
             <a:r>
-              <a:rPr lang="en-US" sz="1600" dirty="0">
+              <a:rPr lang="en-US" sz="2400" dirty="0">
                 <a:effectLst/>
                 <a:latin typeface="Quattrocento Sans" panose="020B0502050000020003" pitchFamily="34" charset="0"/>
                 <a:cs typeface="Arial" pitchFamily="34" charset="0"/>
@@ -7163,7 +7660,7 @@
               <a:t> ́c, Jelena </a:t>
             </a:r>
             <a:r>
-              <a:rPr lang="en-US" sz="1600" dirty="0" err="1">
+              <a:rPr lang="en-US" sz="2400" dirty="0" err="1">
                 <a:effectLst/>
                 <a:latin typeface="Quattrocento Sans" panose="020B0502050000020003" pitchFamily="34" charset="0"/>
                 <a:cs typeface="Arial" pitchFamily="34" charset="0"/>
@@ -7171,7 +7668,7 @@
               <a:t>Cvijovi</a:t>
             </a:r>
             <a:r>
-              <a:rPr lang="en-US" sz="1600" dirty="0">
+              <a:rPr lang="en-US" sz="2400" dirty="0">
                 <a:effectLst/>
                 <a:latin typeface="Quattrocento Sans" panose="020B0502050000020003" pitchFamily="34" charset="0"/>
                 <a:cs typeface="Arial" pitchFamily="34" charset="0"/>
@@ -7179,7 +7676,7 @@
               <a:t> ́c, and </a:t>
             </a:r>
             <a:r>
-              <a:rPr lang="en-US" sz="1600" dirty="0" err="1">
+              <a:rPr lang="en-US" sz="2400" dirty="0" err="1">
                 <a:effectLst/>
                 <a:latin typeface="Quattrocento Sans" panose="020B0502050000020003" pitchFamily="34" charset="0"/>
                 <a:cs typeface="Arial" pitchFamily="34" charset="0"/>
@@ -7187,7 +7684,7 @@
               <a:t>Mladen</a:t>
             </a:r>
             <a:r>
-              <a:rPr lang="en-US" sz="1600" dirty="0">
+              <a:rPr lang="en-US" sz="2400" dirty="0">
                 <a:effectLst/>
                 <a:latin typeface="Quattrocento Sans" panose="020B0502050000020003" pitchFamily="34" charset="0"/>
                 <a:cs typeface="Arial" pitchFamily="34" charset="0"/>
@@ -7195,7 +7692,7 @@
               <a:t> </a:t>
             </a:r>
             <a:r>
-              <a:rPr lang="en-US" sz="1600" dirty="0" err="1">
+              <a:rPr lang="en-US" sz="2400" dirty="0" err="1">
                 <a:effectLst/>
                 <a:latin typeface="Quattrocento Sans" panose="020B0502050000020003" pitchFamily="34" charset="0"/>
                 <a:cs typeface="Arial" pitchFamily="34" charset="0"/>
@@ -7203,7 +7700,7 @@
               <a:t>Gogi</a:t>
             </a:r>
             <a:r>
-              <a:rPr lang="en-US" sz="1600" dirty="0">
+              <a:rPr lang="en-US" sz="2400" dirty="0">
                 <a:effectLst/>
                 <a:latin typeface="Quattrocento Sans" panose="020B0502050000020003" pitchFamily="34" charset="0"/>
                 <a:cs typeface="Arial" pitchFamily="34" charset="0"/>
@@ -7211,7 +7708,7 @@
               <a:t> ́c. 2018. Assessment of the real estate market value in the </a:t>
             </a:r>
             <a:r>
-              <a:rPr lang="en-US" sz="1600" dirty="0" err="1">
+              <a:rPr lang="en-US" sz="2400" dirty="0" err="1">
                 <a:effectLst/>
                 <a:latin typeface="Quattrocento Sans" panose="020B0502050000020003" pitchFamily="34" charset="0"/>
                 <a:cs typeface="Arial" pitchFamily="34" charset="0"/>
@@ -7219,7 +7716,7 @@
               <a:t>european</a:t>
             </a:r>
             <a:r>
-              <a:rPr lang="en-US" sz="1600" dirty="0">
+              <a:rPr lang="en-US" sz="2400" dirty="0">
                 <a:effectLst/>
                 <a:latin typeface="Quattrocento Sans" panose="020B0502050000020003" pitchFamily="34" charset="0"/>
                 <a:cs typeface="Arial" pitchFamily="34" charset="0"/>
@@ -7233,7 +7730,7 @@
                 <a:spcPct val="110000"/>
               </a:lnSpc>
             </a:pPr>
-            <a:endParaRPr lang="en-US" sz="1600" dirty="0">
+            <a:endParaRPr lang="en-US" sz="2400" dirty="0">
               <a:effectLst/>
               <a:latin typeface="Quattrocento Sans" panose="020B0502050000020003" pitchFamily="34" charset="0"/>
               <a:cs typeface="Arial" pitchFamily="34" charset="0"/>
@@ -7246,7 +7743,7 @@
               </a:lnSpc>
             </a:pPr>
             <a:r>
-              <a:rPr lang="en-US" sz="1600" dirty="0" err="1">
+              <a:rPr lang="en-US" sz="2400" dirty="0" err="1">
                 <a:effectLst/>
                 <a:latin typeface="Quattrocento Sans" panose="020B0502050000020003" pitchFamily="34" charset="0"/>
                 <a:cs typeface="Arial" pitchFamily="34" charset="0"/>
@@ -7254,7 +7751,7 @@
               <a:t>Aurélien</a:t>
             </a:r>
             <a:r>
-              <a:rPr lang="en-US" sz="1600" dirty="0">
+              <a:rPr lang="en-US" sz="2400" dirty="0">
                 <a:effectLst/>
                 <a:latin typeface="Quattrocento Sans" panose="020B0502050000020003" pitchFamily="34" charset="0"/>
                 <a:cs typeface="Arial" pitchFamily="34" charset="0"/>
@@ -7262,7 +7759,7 @@
               <a:t> </a:t>
             </a:r>
             <a:r>
-              <a:rPr lang="en-US" sz="1600" dirty="0" err="1">
+              <a:rPr lang="en-US" sz="2400" dirty="0" err="1">
                 <a:effectLst/>
                 <a:latin typeface="Quattrocento Sans" panose="020B0502050000020003" pitchFamily="34" charset="0"/>
                 <a:cs typeface="Arial" pitchFamily="34" charset="0"/>
@@ -7270,7 +7767,7 @@
               <a:t>Géron</a:t>
             </a:r>
             <a:r>
-              <a:rPr lang="en-US" sz="1600" dirty="0">
+              <a:rPr lang="en-US" sz="2400" dirty="0">
                 <a:effectLst/>
                 <a:latin typeface="Quattrocento Sans" panose="020B0502050000020003" pitchFamily="34" charset="0"/>
                 <a:cs typeface="Arial" pitchFamily="34" charset="0"/>
@@ -7278,7 +7775,7 @@
               <a:t>. 2017. Hands-on machine learning with scikit-learn and </a:t>
             </a:r>
             <a:r>
-              <a:rPr lang="en-US" sz="1600" dirty="0" err="1">
+              <a:rPr lang="en-US" sz="2400" dirty="0" err="1">
                 <a:effectLst/>
                 <a:latin typeface="Quattrocento Sans" panose="020B0502050000020003" pitchFamily="34" charset="0"/>
                 <a:cs typeface="Arial" pitchFamily="34" charset="0"/>
@@ -7286,7 +7783,7 @@
               <a:t>tensorflow</a:t>
             </a:r>
             <a:r>
-              <a:rPr lang="en-US" sz="1600" dirty="0">
+              <a:rPr lang="en-US" sz="2400" dirty="0">
                 <a:effectLst/>
                 <a:latin typeface="Quattrocento Sans" panose="020B0502050000020003" pitchFamily="34" charset="0"/>
                 <a:cs typeface="Arial" pitchFamily="34" charset="0"/>
@@ -7300,7 +7797,7 @@
                 <a:spcPct val="110000"/>
               </a:lnSpc>
             </a:pPr>
-            <a:endParaRPr lang="en-US" sz="1600" dirty="0">
+            <a:endParaRPr lang="en-US" sz="2400" dirty="0">
               <a:effectLst/>
               <a:latin typeface="Quattrocento Sans" panose="020B0502050000020003" pitchFamily="34" charset="0"/>
               <a:cs typeface="Arial" pitchFamily="34" charset="0"/>
@@ -7313,7 +7810,7 @@
               </a:lnSpc>
             </a:pPr>
             <a:r>
-              <a:rPr lang="en-US" sz="1600" dirty="0">
+              <a:rPr lang="en-US" sz="2400" dirty="0">
                 <a:effectLst/>
                 <a:latin typeface="Quattrocento Sans" panose="020B0502050000020003" pitchFamily="34" charset="0"/>
                 <a:cs typeface="Arial" pitchFamily="34" charset="0"/>
@@ -7321,7 +7818,7 @@
               <a:t>Nissan Pow, Emil </a:t>
             </a:r>
             <a:r>
-              <a:rPr lang="en-US" sz="1600" dirty="0" err="1">
+              <a:rPr lang="en-US" sz="2400" dirty="0" err="1">
                 <a:effectLst/>
                 <a:latin typeface="Quattrocento Sans" panose="020B0502050000020003" pitchFamily="34" charset="0"/>
                 <a:cs typeface="Arial" pitchFamily="34" charset="0"/>
@@ -7329,7 +7826,7 @@
               <a:t>Janulewicz</a:t>
             </a:r>
             <a:r>
-              <a:rPr lang="en-US" sz="1600" dirty="0">
+              <a:rPr lang="en-US" sz="2400" dirty="0">
                 <a:effectLst/>
                 <a:latin typeface="Quattrocento Sans" panose="020B0502050000020003" pitchFamily="34" charset="0"/>
                 <a:cs typeface="Arial" pitchFamily="34" charset="0"/>
@@ -7337,7 +7834,7 @@
               <a:t>, and L. Liu. 2014. Applied machine learning project 4 prediction of real estate property prices in </a:t>
             </a:r>
             <a:r>
-              <a:rPr lang="en-US" sz="1600" dirty="0" err="1">
+              <a:rPr lang="en-US" sz="2400" dirty="0" err="1">
                 <a:effectLst/>
                 <a:latin typeface="Quattrocento Sans" panose="020B0502050000020003" pitchFamily="34" charset="0"/>
                 <a:cs typeface="Arial" pitchFamily="34" charset="0"/>
@@ -7345,7 +7842,7 @@
               <a:t>montréal</a:t>
             </a:r>
             <a:r>
-              <a:rPr lang="en-US" sz="1600" dirty="0">
+              <a:rPr lang="en-US" sz="2400" dirty="0">
                 <a:effectLst/>
                 <a:latin typeface="Quattrocento Sans" panose="020B0502050000020003" pitchFamily="34" charset="0"/>
                 <a:cs typeface="Arial" pitchFamily="34" charset="0"/>
@@ -7416,10 +7913,10 @@
       </p:sp>
       <p:pic>
         <p:nvPicPr>
-          <p:cNvPr id="3" name="Picture 2">
+          <p:cNvPr id="4" name="Picture 3">
             <a:extLst>
               <a:ext uri="{FF2B5EF4-FFF2-40B4-BE49-F238E27FC236}">
-                <a16:creationId xmlns:a16="http://schemas.microsoft.com/office/drawing/2014/main" id="{FD3745ED-FE05-F1CC-4217-7B845B641E97}"/>
+                <a16:creationId xmlns:a16="http://schemas.microsoft.com/office/drawing/2014/main" id="{DC99F6B9-8A62-843F-A71B-157133F9A7F3}"/>
               </a:ext>
             </a:extLst>
           </p:cNvPr>
@@ -7436,44 +7933,1687 @@
         </p:blipFill>
         <p:spPr>
           <a:xfrm>
-            <a:off x="22546635" y="9814072"/>
-            <a:ext cx="7407586" cy="3482771"/>
+            <a:off x="23726222" y="18988833"/>
+            <a:ext cx="7239000" cy="7098588"/>
           </a:xfrm>
           <a:prstGeom prst="rect">
             <a:avLst/>
           </a:prstGeom>
         </p:spPr>
       </p:pic>
-      <p:pic>
-        <p:nvPicPr>
-          <p:cNvPr id="4" name="Picture 3">
+      <p:graphicFrame>
+        <p:nvGraphicFramePr>
+          <p:cNvPr id="2" name="Table 4">
             <a:extLst>
               <a:ext uri="{FF2B5EF4-FFF2-40B4-BE49-F238E27FC236}">
-                <a16:creationId xmlns:a16="http://schemas.microsoft.com/office/drawing/2014/main" id="{DC99F6B9-8A62-843F-A71B-157133F9A7F3}"/>
+                <a16:creationId xmlns:a16="http://schemas.microsoft.com/office/drawing/2014/main" id="{3E96C97E-5CE0-45C7-826D-264BD9B5BA0F}"/>
               </a:ext>
             </a:extLst>
           </p:cNvPr>
-          <p:cNvPicPr>
-            <a:picLocks noChangeAspect="1"/>
-          </p:cNvPicPr>
-          <p:nvPr/>
-        </p:nvPicPr>
-        <p:blipFill>
-          <a:blip r:embed="rId4"/>
-          <a:stretch>
-            <a:fillRect/>
-          </a:stretch>
-        </p:blipFill>
-        <p:spPr>
-          <a:xfrm>
-            <a:off x="22560489" y="18026062"/>
-            <a:ext cx="4419600" cy="4333875"/>
-          </a:xfrm>
-          <a:prstGeom prst="rect">
-            <a:avLst/>
-          </a:prstGeom>
-        </p:spPr>
-      </p:pic>
+          <p:cNvGraphicFramePr>
+            <a:graphicFrameLocks noGrp="1"/>
+          </p:cNvGraphicFramePr>
+          <p:nvPr>
+            <p:extLst>
+              <p:ext uri="{D42A27DB-BD31-4B8C-83A1-F6EECF244321}">
+                <p14:modId xmlns:p14="http://schemas.microsoft.com/office/powerpoint/2010/main" val="1235662062"/>
+              </p:ext>
+            </p:extLst>
+          </p:nvPr>
+        </p:nvGraphicFramePr>
+        <p:xfrm>
+          <a:off x="22546635" y="9793906"/>
+          <a:ext cx="9598176" cy="8488680"/>
+        </p:xfrm>
+        <a:graphic>
+          <a:graphicData uri="http://schemas.openxmlformats.org/drawingml/2006/table">
+            <a:tbl>
+              <a:tblPr firstRow="1" bandRow="1">
+                <a:tableStyleId>{7DF18680-E054-41AD-8BC1-D1AEF772440D}</a:tableStyleId>
+              </a:tblPr>
+              <a:tblGrid>
+                <a:gridCol w="1371168">
+                  <a:extLst>
+                    <a:ext uri="{9D8B030D-6E8A-4147-A177-3AD203B41FA5}">
+                      <a16:colId xmlns:a16="http://schemas.microsoft.com/office/drawing/2014/main" val="1024263966"/>
+                    </a:ext>
+                  </a:extLst>
+                </a:gridCol>
+                <a:gridCol w="1371168">
+                  <a:extLst>
+                    <a:ext uri="{9D8B030D-6E8A-4147-A177-3AD203B41FA5}">
+                      <a16:colId xmlns:a16="http://schemas.microsoft.com/office/drawing/2014/main" val="3168763129"/>
+                    </a:ext>
+                  </a:extLst>
+                </a:gridCol>
+                <a:gridCol w="1371168">
+                  <a:extLst>
+                    <a:ext uri="{9D8B030D-6E8A-4147-A177-3AD203B41FA5}">
+                      <a16:colId xmlns:a16="http://schemas.microsoft.com/office/drawing/2014/main" val="1274421626"/>
+                    </a:ext>
+                  </a:extLst>
+                </a:gridCol>
+                <a:gridCol w="1371168">
+                  <a:extLst>
+                    <a:ext uri="{9D8B030D-6E8A-4147-A177-3AD203B41FA5}">
+                      <a16:colId xmlns:a16="http://schemas.microsoft.com/office/drawing/2014/main" val="2265643893"/>
+                    </a:ext>
+                  </a:extLst>
+                </a:gridCol>
+                <a:gridCol w="1371168">
+                  <a:extLst>
+                    <a:ext uri="{9D8B030D-6E8A-4147-A177-3AD203B41FA5}">
+                      <a16:colId xmlns:a16="http://schemas.microsoft.com/office/drawing/2014/main" val="3631806491"/>
+                    </a:ext>
+                  </a:extLst>
+                </a:gridCol>
+                <a:gridCol w="1371168">
+                  <a:extLst>
+                    <a:ext uri="{9D8B030D-6E8A-4147-A177-3AD203B41FA5}">
+                      <a16:colId xmlns:a16="http://schemas.microsoft.com/office/drawing/2014/main" val="3259986364"/>
+                    </a:ext>
+                  </a:extLst>
+                </a:gridCol>
+                <a:gridCol w="1371168">
+                  <a:extLst>
+                    <a:ext uri="{9D8B030D-6E8A-4147-A177-3AD203B41FA5}">
+                      <a16:colId xmlns:a16="http://schemas.microsoft.com/office/drawing/2014/main" val="3485576353"/>
+                    </a:ext>
+                  </a:extLst>
+                </a:gridCol>
+              </a:tblGrid>
+              <a:tr h="146822">
+                <a:tc>
+                  <a:txBody>
+                    <a:bodyPr/>
+                    <a:lstStyle/>
+                    <a:p>
+                      <a:r>
+                        <a:rPr lang="en-US" b="1" dirty="0"/>
+                        <a:t>variable</a:t>
+                      </a:r>
+                    </a:p>
+                  </a:txBody>
+                  <a:tcPr/>
+                </a:tc>
+                <a:tc>
+                  <a:txBody>
+                    <a:bodyPr/>
+                    <a:lstStyle/>
+                    <a:p>
+                      <a:pPr algn="r" fontAlgn="ctr"/>
+                      <a:r>
+                        <a:rPr lang="en-US" b="1" dirty="0" err="1">
+                          <a:effectLst/>
+                        </a:rPr>
+                        <a:t>coef</a:t>
+                      </a:r>
+                      <a:endParaRPr lang="en-US" b="1" dirty="0">
+                        <a:effectLst/>
+                      </a:endParaRPr>
+                    </a:p>
+                  </a:txBody>
+                  <a:tcPr marL="76200" marR="76200" marT="38100" marB="38100" anchor="ctr"/>
+                </a:tc>
+                <a:tc>
+                  <a:txBody>
+                    <a:bodyPr/>
+                    <a:lstStyle/>
+                    <a:p>
+                      <a:pPr algn="r" fontAlgn="ctr"/>
+                      <a:r>
+                        <a:rPr lang="en-US" b="1" dirty="0">
+                          <a:effectLst/>
+                        </a:rPr>
+                        <a:t>std err</a:t>
+                      </a:r>
+                    </a:p>
+                  </a:txBody>
+                  <a:tcPr marL="76200" marR="76200" marT="38100" marB="38100" anchor="ctr"/>
+                </a:tc>
+                <a:tc>
+                  <a:txBody>
+                    <a:bodyPr/>
+                    <a:lstStyle/>
+                    <a:p>
+                      <a:pPr algn="r" fontAlgn="ctr"/>
+                      <a:r>
+                        <a:rPr lang="en-US" b="1">
+                          <a:effectLst/>
+                        </a:rPr>
+                        <a:t>t</a:t>
+                      </a:r>
+                    </a:p>
+                  </a:txBody>
+                  <a:tcPr marL="76200" marR="76200" marT="38100" marB="38100" anchor="ctr"/>
+                </a:tc>
+                <a:tc>
+                  <a:txBody>
+                    <a:bodyPr/>
+                    <a:lstStyle/>
+                    <a:p>
+                      <a:pPr algn="r" fontAlgn="ctr"/>
+                      <a:r>
+                        <a:rPr lang="en-US" b="1">
+                          <a:effectLst/>
+                        </a:rPr>
+                        <a:t>P&gt;|t|</a:t>
+                      </a:r>
+                    </a:p>
+                  </a:txBody>
+                  <a:tcPr marL="76200" marR="76200" marT="38100" marB="38100" anchor="ctr"/>
+                </a:tc>
+                <a:tc>
+                  <a:txBody>
+                    <a:bodyPr/>
+                    <a:lstStyle/>
+                    <a:p>
+                      <a:pPr algn="r" fontAlgn="ctr"/>
+                      <a:r>
+                        <a:rPr lang="en-US" b="1" dirty="0">
+                          <a:effectLst/>
+                        </a:rPr>
+                        <a:t>[0.025</a:t>
+                      </a:r>
+                    </a:p>
+                  </a:txBody>
+                  <a:tcPr marL="76200" marR="76200" marT="38100" marB="38100" anchor="ctr"/>
+                </a:tc>
+                <a:tc>
+                  <a:txBody>
+                    <a:bodyPr/>
+                    <a:lstStyle/>
+                    <a:p>
+                      <a:pPr algn="r" fontAlgn="ctr"/>
+                      <a:r>
+                        <a:rPr lang="en-US" b="1" dirty="0">
+                          <a:effectLst/>
+                        </a:rPr>
+                        <a:t>0.975]</a:t>
+                      </a:r>
+                    </a:p>
+                  </a:txBody>
+                  <a:tcPr marL="76200" marR="76200" marT="38100" marB="38100" anchor="ctr"/>
+                </a:tc>
+                <a:extLst>
+                  <a:ext uri="{0D108BD9-81ED-4DB2-BD59-A6C34878D82A}">
+                    <a16:rowId xmlns:a16="http://schemas.microsoft.com/office/drawing/2014/main" val="3941224372"/>
+                  </a:ext>
+                </a:extLst>
+              </a:tr>
+              <a:tr h="140704">
+                <a:tc>
+                  <a:txBody>
+                    <a:bodyPr/>
+                    <a:lstStyle/>
+                    <a:p>
+                      <a:pPr algn="r" fontAlgn="ctr"/>
+                      <a:r>
+                        <a:rPr lang="en-US" b="0" dirty="0">
+                          <a:effectLst/>
+                        </a:rPr>
+                        <a:t>longitude</a:t>
+                      </a:r>
+                    </a:p>
+                  </a:txBody>
+                  <a:tcPr marL="76200" marR="76200" marT="38100" marB="38100" anchor="ctr"/>
+                </a:tc>
+                <a:tc>
+                  <a:txBody>
+                    <a:bodyPr/>
+                    <a:lstStyle/>
+                    <a:p>
+                      <a:r>
+                        <a:rPr lang="en-US" dirty="0">
+                          <a:effectLst/>
+                        </a:rPr>
+                        <a:t>-0.4537</a:t>
+                      </a:r>
+                    </a:p>
+                  </a:txBody>
+                  <a:tcPr marL="76200" marR="76200" marT="38100" marB="38100" anchor="ctr"/>
+                </a:tc>
+                <a:tc>
+                  <a:txBody>
+                    <a:bodyPr/>
+                    <a:lstStyle/>
+                    <a:p>
+                      <a:r>
+                        <a:rPr lang="en-US" dirty="0">
+                          <a:effectLst/>
+                        </a:rPr>
+                        <a:t>0.042</a:t>
+                      </a:r>
+                    </a:p>
+                  </a:txBody>
+                  <a:tcPr marL="76200" marR="76200" marT="38100" marB="38100" anchor="ctr"/>
+                </a:tc>
+                <a:tc>
+                  <a:txBody>
+                    <a:bodyPr/>
+                    <a:lstStyle/>
+                    <a:p>
+                      <a:r>
+                        <a:rPr lang="en-US" dirty="0">
+                          <a:effectLst/>
+                        </a:rPr>
+                        <a:t>-10.749</a:t>
+                      </a:r>
+                    </a:p>
+                  </a:txBody>
+                  <a:tcPr marL="76200" marR="76200" marT="38100" marB="38100" anchor="ctr"/>
+                </a:tc>
+                <a:tc>
+                  <a:txBody>
+                    <a:bodyPr/>
+                    <a:lstStyle/>
+                    <a:p>
+                      <a:r>
+                        <a:rPr lang="en-US" dirty="0">
+                          <a:effectLst/>
+                        </a:rPr>
+                        <a:t>0.000</a:t>
+                      </a:r>
+                    </a:p>
+                  </a:txBody>
+                  <a:tcPr marL="76200" marR="76200" marT="38100" marB="38100" anchor="ctr"/>
+                </a:tc>
+                <a:tc>
+                  <a:txBody>
+                    <a:bodyPr/>
+                    <a:lstStyle/>
+                    <a:p>
+                      <a:r>
+                        <a:rPr lang="en-US" dirty="0">
+                          <a:effectLst/>
+                        </a:rPr>
+                        <a:t>-0.536</a:t>
+                      </a:r>
+                    </a:p>
+                  </a:txBody>
+                  <a:tcPr marL="76200" marR="76200" marT="38100" marB="38100" anchor="ctr"/>
+                </a:tc>
+                <a:tc>
+                  <a:txBody>
+                    <a:bodyPr/>
+                    <a:lstStyle/>
+                    <a:p>
+                      <a:r>
+                        <a:rPr lang="en-US">
+                          <a:effectLst/>
+                        </a:rPr>
+                        <a:t>-0.371</a:t>
+                      </a:r>
+                    </a:p>
+                  </a:txBody>
+                  <a:tcPr marL="76200" marR="76200" marT="38100" marB="38100" anchor="ctr"/>
+                </a:tc>
+                <a:extLst>
+                  <a:ext uri="{0D108BD9-81ED-4DB2-BD59-A6C34878D82A}">
+                    <a16:rowId xmlns:a16="http://schemas.microsoft.com/office/drawing/2014/main" val="3249728376"/>
+                  </a:ext>
+                </a:extLst>
+              </a:tr>
+              <a:tr h="140704">
+                <a:tc>
+                  <a:txBody>
+                    <a:bodyPr/>
+                    <a:lstStyle/>
+                    <a:p>
+                      <a:pPr algn="r" fontAlgn="ctr"/>
+                      <a:r>
+                        <a:rPr lang="en-US" b="0" dirty="0">
+                          <a:effectLst/>
+                        </a:rPr>
+                        <a:t>latitude</a:t>
+                      </a:r>
+                    </a:p>
+                  </a:txBody>
+                  <a:tcPr marL="76200" marR="76200" marT="38100" marB="38100" anchor="ctr"/>
+                </a:tc>
+                <a:tc>
+                  <a:txBody>
+                    <a:bodyPr/>
+                    <a:lstStyle/>
+                    <a:p>
+                      <a:r>
+                        <a:rPr lang="en-US" dirty="0">
+                          <a:effectLst/>
+                        </a:rPr>
+                        <a:t>-0.4610</a:t>
+                      </a:r>
+                    </a:p>
+                  </a:txBody>
+                  <a:tcPr marL="76200" marR="76200" marT="38100" marB="38100" anchor="ctr"/>
+                </a:tc>
+                <a:tc>
+                  <a:txBody>
+                    <a:bodyPr/>
+                    <a:lstStyle/>
+                    <a:p>
+                      <a:r>
+                        <a:rPr lang="en-US">
+                          <a:effectLst/>
+                        </a:rPr>
+                        <a:t>0.045</a:t>
+                      </a:r>
+                    </a:p>
+                  </a:txBody>
+                  <a:tcPr marL="76200" marR="76200" marT="38100" marB="38100" anchor="ctr"/>
+                </a:tc>
+                <a:tc>
+                  <a:txBody>
+                    <a:bodyPr/>
+                    <a:lstStyle/>
+                    <a:p>
+                      <a:r>
+                        <a:rPr lang="en-US">
+                          <a:effectLst/>
+                        </a:rPr>
+                        <a:t>-10.247</a:t>
+                      </a:r>
+                    </a:p>
+                  </a:txBody>
+                  <a:tcPr marL="76200" marR="76200" marT="38100" marB="38100" anchor="ctr"/>
+                </a:tc>
+                <a:tc>
+                  <a:txBody>
+                    <a:bodyPr/>
+                    <a:lstStyle/>
+                    <a:p>
+                      <a:r>
+                        <a:rPr lang="en-US">
+                          <a:effectLst/>
+                        </a:rPr>
+                        <a:t>0.000</a:t>
+                      </a:r>
+                    </a:p>
+                  </a:txBody>
+                  <a:tcPr marL="76200" marR="76200" marT="38100" marB="38100" anchor="ctr"/>
+                </a:tc>
+                <a:tc>
+                  <a:txBody>
+                    <a:bodyPr/>
+                    <a:lstStyle/>
+                    <a:p>
+                      <a:r>
+                        <a:rPr lang="en-US">
+                          <a:effectLst/>
+                        </a:rPr>
+                        <a:t>-0.549</a:t>
+                      </a:r>
+                    </a:p>
+                  </a:txBody>
+                  <a:tcPr marL="76200" marR="76200" marT="38100" marB="38100" anchor="ctr"/>
+                </a:tc>
+                <a:tc>
+                  <a:txBody>
+                    <a:bodyPr/>
+                    <a:lstStyle/>
+                    <a:p>
+                      <a:r>
+                        <a:rPr lang="en-US">
+                          <a:effectLst/>
+                        </a:rPr>
+                        <a:t>-0.373</a:t>
+                      </a:r>
+                    </a:p>
+                  </a:txBody>
+                  <a:tcPr marL="76200" marR="76200" marT="38100" marB="38100" anchor="ctr"/>
+                </a:tc>
+                <a:extLst>
+                  <a:ext uri="{0D108BD9-81ED-4DB2-BD59-A6C34878D82A}">
+                    <a16:rowId xmlns:a16="http://schemas.microsoft.com/office/drawing/2014/main" val="2830474411"/>
+                  </a:ext>
+                </a:extLst>
+              </a:tr>
+              <a:tr h="250821">
+                <a:tc>
+                  <a:txBody>
+                    <a:bodyPr/>
+                    <a:lstStyle/>
+                    <a:p>
+                      <a:pPr algn="r" fontAlgn="ctr"/>
+                      <a:r>
+                        <a:rPr lang="en-US" b="0">
+                          <a:effectLst/>
+                        </a:rPr>
+                        <a:t>housing_median_age</a:t>
+                      </a:r>
+                    </a:p>
+                  </a:txBody>
+                  <a:tcPr marL="76200" marR="76200" marT="38100" marB="38100" anchor="ctr"/>
+                </a:tc>
+                <a:tc>
+                  <a:txBody>
+                    <a:bodyPr/>
+                    <a:lstStyle/>
+                    <a:p>
+                      <a:r>
+                        <a:rPr lang="en-US" dirty="0">
+                          <a:effectLst/>
+                        </a:rPr>
+                        <a:t>0.1135</a:t>
+                      </a:r>
+                    </a:p>
+                  </a:txBody>
+                  <a:tcPr marL="76200" marR="76200" marT="38100" marB="38100" anchor="ctr"/>
+                </a:tc>
+                <a:tc>
+                  <a:txBody>
+                    <a:bodyPr/>
+                    <a:lstStyle/>
+                    <a:p>
+                      <a:r>
+                        <a:rPr lang="en-US">
+                          <a:effectLst/>
+                        </a:rPr>
+                        <a:t>0.012</a:t>
+                      </a:r>
+                    </a:p>
+                  </a:txBody>
+                  <a:tcPr marL="76200" marR="76200" marT="38100" marB="38100" anchor="ctr"/>
+                </a:tc>
+                <a:tc>
+                  <a:txBody>
+                    <a:bodyPr/>
+                    <a:lstStyle/>
+                    <a:p>
+                      <a:r>
+                        <a:rPr lang="en-US">
+                          <a:effectLst/>
+                        </a:rPr>
+                        <a:t>9.657</a:t>
+                      </a:r>
+                    </a:p>
+                  </a:txBody>
+                  <a:tcPr marL="76200" marR="76200" marT="38100" marB="38100" anchor="ctr"/>
+                </a:tc>
+                <a:tc>
+                  <a:txBody>
+                    <a:bodyPr/>
+                    <a:lstStyle/>
+                    <a:p>
+                      <a:r>
+                        <a:rPr lang="en-US">
+                          <a:effectLst/>
+                        </a:rPr>
+                        <a:t>0.000</a:t>
+                      </a:r>
+                    </a:p>
+                  </a:txBody>
+                  <a:tcPr marL="76200" marR="76200" marT="38100" marB="38100" anchor="ctr"/>
+                </a:tc>
+                <a:tc>
+                  <a:txBody>
+                    <a:bodyPr/>
+                    <a:lstStyle/>
+                    <a:p>
+                      <a:r>
+                        <a:rPr lang="en-US">
+                          <a:effectLst/>
+                        </a:rPr>
+                        <a:t>0.090</a:t>
+                      </a:r>
+                    </a:p>
+                  </a:txBody>
+                  <a:tcPr marL="76200" marR="76200" marT="38100" marB="38100" anchor="ctr"/>
+                </a:tc>
+                <a:tc>
+                  <a:txBody>
+                    <a:bodyPr/>
+                    <a:lstStyle/>
+                    <a:p>
+                      <a:r>
+                        <a:rPr lang="en-US">
+                          <a:effectLst/>
+                        </a:rPr>
+                        <a:t>0.137</a:t>
+                      </a:r>
+                    </a:p>
+                  </a:txBody>
+                  <a:tcPr marL="76200" marR="76200" marT="38100" marB="38100" anchor="ctr"/>
+                </a:tc>
+                <a:extLst>
+                  <a:ext uri="{0D108BD9-81ED-4DB2-BD59-A6C34878D82A}">
+                    <a16:rowId xmlns:a16="http://schemas.microsoft.com/office/drawing/2014/main" val="325995866"/>
+                  </a:ext>
+                </a:extLst>
+              </a:tr>
+              <a:tr h="140704">
+                <a:tc>
+                  <a:txBody>
+                    <a:bodyPr/>
+                    <a:lstStyle/>
+                    <a:p>
+                      <a:pPr algn="r" fontAlgn="ctr"/>
+                      <a:r>
+                        <a:rPr lang="en-US" b="0">
+                          <a:effectLst/>
+                        </a:rPr>
+                        <a:t>total_rooms</a:t>
+                      </a:r>
+                    </a:p>
+                  </a:txBody>
+                  <a:tcPr marL="76200" marR="76200" marT="38100" marB="38100" anchor="ctr"/>
+                </a:tc>
+                <a:tc>
+                  <a:txBody>
+                    <a:bodyPr/>
+                    <a:lstStyle/>
+                    <a:p>
+                      <a:r>
+                        <a:rPr lang="en-US">
+                          <a:effectLst/>
+                        </a:rPr>
+                        <a:t>-0.1826</a:t>
+                      </a:r>
+                    </a:p>
+                  </a:txBody>
+                  <a:tcPr marL="76200" marR="76200" marT="38100" marB="38100" anchor="ctr"/>
+                </a:tc>
+                <a:tc>
+                  <a:txBody>
+                    <a:bodyPr/>
+                    <a:lstStyle/>
+                    <a:p>
+                      <a:r>
+                        <a:rPr lang="en-US">
+                          <a:effectLst/>
+                        </a:rPr>
+                        <a:t>0.038</a:t>
+                      </a:r>
+                    </a:p>
+                  </a:txBody>
+                  <a:tcPr marL="76200" marR="76200" marT="38100" marB="38100" anchor="ctr"/>
+                </a:tc>
+                <a:tc>
+                  <a:txBody>
+                    <a:bodyPr/>
+                    <a:lstStyle/>
+                    <a:p>
+                      <a:r>
+                        <a:rPr lang="en-US">
+                          <a:effectLst/>
+                        </a:rPr>
+                        <a:t>-4.758</a:t>
+                      </a:r>
+                    </a:p>
+                  </a:txBody>
+                  <a:tcPr marL="76200" marR="76200" marT="38100" marB="38100" anchor="ctr"/>
+                </a:tc>
+                <a:tc>
+                  <a:txBody>
+                    <a:bodyPr/>
+                    <a:lstStyle/>
+                    <a:p>
+                      <a:r>
+                        <a:rPr lang="en-US">
+                          <a:effectLst/>
+                        </a:rPr>
+                        <a:t>0.000</a:t>
+                      </a:r>
+                    </a:p>
+                  </a:txBody>
+                  <a:tcPr marL="76200" marR="76200" marT="38100" marB="38100" anchor="ctr"/>
+                </a:tc>
+                <a:tc>
+                  <a:txBody>
+                    <a:bodyPr/>
+                    <a:lstStyle/>
+                    <a:p>
+                      <a:r>
+                        <a:rPr lang="en-US">
+                          <a:effectLst/>
+                        </a:rPr>
+                        <a:t>-0.258</a:t>
+                      </a:r>
+                    </a:p>
+                  </a:txBody>
+                  <a:tcPr marL="76200" marR="76200" marT="38100" marB="38100" anchor="ctr"/>
+                </a:tc>
+                <a:tc>
+                  <a:txBody>
+                    <a:bodyPr/>
+                    <a:lstStyle/>
+                    <a:p>
+                      <a:r>
+                        <a:rPr lang="en-US">
+                          <a:effectLst/>
+                        </a:rPr>
+                        <a:t>-0.107</a:t>
+                      </a:r>
+                    </a:p>
+                  </a:txBody>
+                  <a:tcPr marL="76200" marR="76200" marT="38100" marB="38100" anchor="ctr"/>
+                </a:tc>
+                <a:extLst>
+                  <a:ext uri="{0D108BD9-81ED-4DB2-BD59-A6C34878D82A}">
+                    <a16:rowId xmlns:a16="http://schemas.microsoft.com/office/drawing/2014/main" val="1279435805"/>
+                  </a:ext>
+                </a:extLst>
+              </a:tr>
+              <a:tr h="250821">
+                <a:tc>
+                  <a:txBody>
+                    <a:bodyPr/>
+                    <a:lstStyle/>
+                    <a:p>
+                      <a:pPr algn="r" fontAlgn="ctr"/>
+                      <a:r>
+                        <a:rPr lang="en-US" b="0">
+                          <a:effectLst/>
+                        </a:rPr>
+                        <a:t>total_bedrooms</a:t>
+                      </a:r>
+                    </a:p>
+                  </a:txBody>
+                  <a:tcPr marL="76200" marR="76200" marT="38100" marB="38100" anchor="ctr"/>
+                </a:tc>
+                <a:tc>
+                  <a:txBody>
+                    <a:bodyPr/>
+                    <a:lstStyle/>
+                    <a:p>
+                      <a:r>
+                        <a:rPr lang="en-US">
+                          <a:effectLst/>
+                        </a:rPr>
+                        <a:t>0.3079</a:t>
+                      </a:r>
+                    </a:p>
+                  </a:txBody>
+                  <a:tcPr marL="76200" marR="76200" marT="38100" marB="38100" anchor="ctr"/>
+                </a:tc>
+                <a:tc>
+                  <a:txBody>
+                    <a:bodyPr/>
+                    <a:lstStyle/>
+                    <a:p>
+                      <a:r>
+                        <a:rPr lang="en-US">
+                          <a:effectLst/>
+                        </a:rPr>
+                        <a:t>0.055</a:t>
+                      </a:r>
+                    </a:p>
+                  </a:txBody>
+                  <a:tcPr marL="76200" marR="76200" marT="38100" marB="38100" anchor="ctr"/>
+                </a:tc>
+                <a:tc>
+                  <a:txBody>
+                    <a:bodyPr/>
+                    <a:lstStyle/>
+                    <a:p>
+                      <a:r>
+                        <a:rPr lang="en-US">
+                          <a:effectLst/>
+                        </a:rPr>
+                        <a:t>5.572</a:t>
+                      </a:r>
+                    </a:p>
+                  </a:txBody>
+                  <a:tcPr marL="76200" marR="76200" marT="38100" marB="38100" anchor="ctr"/>
+                </a:tc>
+                <a:tc>
+                  <a:txBody>
+                    <a:bodyPr/>
+                    <a:lstStyle/>
+                    <a:p>
+                      <a:r>
+                        <a:rPr lang="en-US">
+                          <a:effectLst/>
+                        </a:rPr>
+                        <a:t>0.000</a:t>
+                      </a:r>
+                    </a:p>
+                  </a:txBody>
+                  <a:tcPr marL="76200" marR="76200" marT="38100" marB="38100" anchor="ctr"/>
+                </a:tc>
+                <a:tc>
+                  <a:txBody>
+                    <a:bodyPr/>
+                    <a:lstStyle/>
+                    <a:p>
+                      <a:r>
+                        <a:rPr lang="en-US">
+                          <a:effectLst/>
+                        </a:rPr>
+                        <a:t>0.200</a:t>
+                      </a:r>
+                    </a:p>
+                  </a:txBody>
+                  <a:tcPr marL="76200" marR="76200" marT="38100" marB="38100" anchor="ctr"/>
+                </a:tc>
+                <a:tc>
+                  <a:txBody>
+                    <a:bodyPr/>
+                    <a:lstStyle/>
+                    <a:p>
+                      <a:r>
+                        <a:rPr lang="en-US">
+                          <a:effectLst/>
+                        </a:rPr>
+                        <a:t>0.416</a:t>
+                      </a:r>
+                    </a:p>
+                  </a:txBody>
+                  <a:tcPr marL="76200" marR="76200" marT="38100" marB="38100" anchor="ctr"/>
+                </a:tc>
+                <a:extLst>
+                  <a:ext uri="{0D108BD9-81ED-4DB2-BD59-A6C34878D82A}">
+                    <a16:rowId xmlns:a16="http://schemas.microsoft.com/office/drawing/2014/main" val="313484537"/>
+                  </a:ext>
+                </a:extLst>
+              </a:tr>
+              <a:tr h="140704">
+                <a:tc>
+                  <a:txBody>
+                    <a:bodyPr/>
+                    <a:lstStyle/>
+                    <a:p>
+                      <a:pPr algn="r" fontAlgn="ctr"/>
+                      <a:r>
+                        <a:rPr lang="en-US" b="0">
+                          <a:effectLst/>
+                        </a:rPr>
+                        <a:t>population</a:t>
+                      </a:r>
+                    </a:p>
+                  </a:txBody>
+                  <a:tcPr marL="76200" marR="76200" marT="38100" marB="38100" anchor="ctr"/>
+                </a:tc>
+                <a:tc>
+                  <a:txBody>
+                    <a:bodyPr/>
+                    <a:lstStyle/>
+                    <a:p>
+                      <a:r>
+                        <a:rPr lang="en-US">
+                          <a:effectLst/>
+                        </a:rPr>
+                        <a:t>-0.4674</a:t>
+                      </a:r>
+                    </a:p>
+                  </a:txBody>
+                  <a:tcPr marL="76200" marR="76200" marT="38100" marB="38100" anchor="ctr"/>
+                </a:tc>
+                <a:tc>
+                  <a:txBody>
+                    <a:bodyPr/>
+                    <a:lstStyle/>
+                    <a:p>
+                      <a:r>
+                        <a:rPr lang="en-US">
+                          <a:effectLst/>
+                        </a:rPr>
+                        <a:t>0.028</a:t>
+                      </a:r>
+                    </a:p>
+                  </a:txBody>
+                  <a:tcPr marL="76200" marR="76200" marT="38100" marB="38100" anchor="ctr"/>
+                </a:tc>
+                <a:tc>
+                  <a:txBody>
+                    <a:bodyPr/>
+                    <a:lstStyle/>
+                    <a:p>
+                      <a:r>
+                        <a:rPr lang="en-US">
+                          <a:effectLst/>
+                        </a:rPr>
+                        <a:t>-16.558</a:t>
+                      </a:r>
+                    </a:p>
+                  </a:txBody>
+                  <a:tcPr marL="76200" marR="76200" marT="38100" marB="38100" anchor="ctr"/>
+                </a:tc>
+                <a:tc>
+                  <a:txBody>
+                    <a:bodyPr/>
+                    <a:lstStyle/>
+                    <a:p>
+                      <a:r>
+                        <a:rPr lang="en-US">
+                          <a:effectLst/>
+                        </a:rPr>
+                        <a:t>0.000</a:t>
+                      </a:r>
+                    </a:p>
+                  </a:txBody>
+                  <a:tcPr marL="76200" marR="76200" marT="38100" marB="38100" anchor="ctr"/>
+                </a:tc>
+                <a:tc>
+                  <a:txBody>
+                    <a:bodyPr/>
+                    <a:lstStyle/>
+                    <a:p>
+                      <a:r>
+                        <a:rPr lang="en-US">
+                          <a:effectLst/>
+                        </a:rPr>
+                        <a:t>-0.523</a:t>
+                      </a:r>
+                    </a:p>
+                  </a:txBody>
+                  <a:tcPr marL="76200" marR="76200" marT="38100" marB="38100" anchor="ctr"/>
+                </a:tc>
+                <a:tc>
+                  <a:txBody>
+                    <a:bodyPr/>
+                    <a:lstStyle/>
+                    <a:p>
+                      <a:r>
+                        <a:rPr lang="en-US">
+                          <a:effectLst/>
+                        </a:rPr>
+                        <a:t>-0.412</a:t>
+                      </a:r>
+                    </a:p>
+                  </a:txBody>
+                  <a:tcPr marL="76200" marR="76200" marT="38100" marB="38100" anchor="ctr"/>
+                </a:tc>
+                <a:extLst>
+                  <a:ext uri="{0D108BD9-81ED-4DB2-BD59-A6C34878D82A}">
+                    <a16:rowId xmlns:a16="http://schemas.microsoft.com/office/drawing/2014/main" val="1507684607"/>
+                  </a:ext>
+                </a:extLst>
+              </a:tr>
+              <a:tr h="140704">
+                <a:tc>
+                  <a:txBody>
+                    <a:bodyPr/>
+                    <a:lstStyle/>
+                    <a:p>
+                      <a:pPr algn="r" fontAlgn="ctr"/>
+                      <a:r>
+                        <a:rPr lang="en-US" b="0">
+                          <a:effectLst/>
+                        </a:rPr>
+                        <a:t>households</a:t>
+                      </a:r>
+                    </a:p>
+                  </a:txBody>
+                  <a:tcPr marL="76200" marR="76200" marT="38100" marB="38100" anchor="ctr"/>
+                </a:tc>
+                <a:tc>
+                  <a:txBody>
+                    <a:bodyPr/>
+                    <a:lstStyle/>
+                    <a:p>
+                      <a:r>
+                        <a:rPr lang="en-US">
+                          <a:effectLst/>
+                        </a:rPr>
+                        <a:t>0.3849</a:t>
+                      </a:r>
+                    </a:p>
+                  </a:txBody>
+                  <a:tcPr marL="76200" marR="76200" marT="38100" marB="38100" anchor="ctr"/>
+                </a:tc>
+                <a:tc>
+                  <a:txBody>
+                    <a:bodyPr/>
+                    <a:lstStyle/>
+                    <a:p>
+                      <a:r>
+                        <a:rPr lang="en-US">
+                          <a:effectLst/>
+                        </a:rPr>
+                        <a:t>0.057</a:t>
+                      </a:r>
+                    </a:p>
+                  </a:txBody>
+                  <a:tcPr marL="76200" marR="76200" marT="38100" marB="38100" anchor="ctr"/>
+                </a:tc>
+                <a:tc>
+                  <a:txBody>
+                    <a:bodyPr/>
+                    <a:lstStyle/>
+                    <a:p>
+                      <a:r>
+                        <a:rPr lang="en-US">
+                          <a:effectLst/>
+                        </a:rPr>
+                        <a:t>6.770</a:t>
+                      </a:r>
+                    </a:p>
+                  </a:txBody>
+                  <a:tcPr marL="76200" marR="76200" marT="38100" marB="38100" anchor="ctr"/>
+                </a:tc>
+                <a:tc>
+                  <a:txBody>
+                    <a:bodyPr/>
+                    <a:lstStyle/>
+                    <a:p>
+                      <a:r>
+                        <a:rPr lang="en-US">
+                          <a:effectLst/>
+                        </a:rPr>
+                        <a:t>0.000</a:t>
+                      </a:r>
+                    </a:p>
+                  </a:txBody>
+                  <a:tcPr marL="76200" marR="76200" marT="38100" marB="38100" anchor="ctr"/>
+                </a:tc>
+                <a:tc>
+                  <a:txBody>
+                    <a:bodyPr/>
+                    <a:lstStyle/>
+                    <a:p>
+                      <a:r>
+                        <a:rPr lang="en-US">
+                          <a:effectLst/>
+                        </a:rPr>
+                        <a:t>0.273</a:t>
+                      </a:r>
+                    </a:p>
+                  </a:txBody>
+                  <a:tcPr marL="76200" marR="76200" marT="38100" marB="38100" anchor="ctr"/>
+                </a:tc>
+                <a:tc>
+                  <a:txBody>
+                    <a:bodyPr/>
+                    <a:lstStyle/>
+                    <a:p>
+                      <a:r>
+                        <a:rPr lang="en-US">
+                          <a:effectLst/>
+                        </a:rPr>
+                        <a:t>0.496</a:t>
+                      </a:r>
+                    </a:p>
+                  </a:txBody>
+                  <a:tcPr marL="76200" marR="76200" marT="38100" marB="38100" anchor="ctr"/>
+                </a:tc>
+                <a:extLst>
+                  <a:ext uri="{0D108BD9-81ED-4DB2-BD59-A6C34878D82A}">
+                    <a16:rowId xmlns:a16="http://schemas.microsoft.com/office/drawing/2014/main" val="2525635978"/>
+                  </a:ext>
+                </a:extLst>
+              </a:tr>
+              <a:tr h="250821">
+                <a:tc>
+                  <a:txBody>
+                    <a:bodyPr/>
+                    <a:lstStyle/>
+                    <a:p>
+                      <a:pPr algn="r" fontAlgn="ctr"/>
+                      <a:r>
+                        <a:rPr lang="en-US" b="0">
+                          <a:effectLst/>
+                        </a:rPr>
+                        <a:t>median_income</a:t>
+                      </a:r>
+                    </a:p>
+                  </a:txBody>
+                  <a:tcPr marL="76200" marR="76200" marT="38100" marB="38100" anchor="ctr"/>
+                </a:tc>
+                <a:tc>
+                  <a:txBody>
+                    <a:bodyPr/>
+                    <a:lstStyle/>
+                    <a:p>
+                      <a:r>
+                        <a:rPr lang="en-US">
+                          <a:effectLst/>
+                        </a:rPr>
+                        <a:t>0.6684</a:t>
+                      </a:r>
+                    </a:p>
+                  </a:txBody>
+                  <a:tcPr marL="76200" marR="76200" marT="38100" marB="38100" anchor="ctr"/>
+                </a:tc>
+                <a:tc>
+                  <a:txBody>
+                    <a:bodyPr/>
+                    <a:lstStyle/>
+                    <a:p>
+                      <a:r>
+                        <a:rPr lang="en-US">
+                          <a:effectLst/>
+                        </a:rPr>
+                        <a:t>0.014</a:t>
+                      </a:r>
+                    </a:p>
+                  </a:txBody>
+                  <a:tcPr marL="76200" marR="76200" marT="38100" marB="38100" anchor="ctr"/>
+                </a:tc>
+                <a:tc>
+                  <a:txBody>
+                    <a:bodyPr/>
+                    <a:lstStyle/>
+                    <a:p>
+                      <a:r>
+                        <a:rPr lang="en-US">
+                          <a:effectLst/>
+                        </a:rPr>
+                        <a:t>48.123</a:t>
+                      </a:r>
+                    </a:p>
+                  </a:txBody>
+                  <a:tcPr marL="76200" marR="76200" marT="38100" marB="38100" anchor="ctr"/>
+                </a:tc>
+                <a:tc>
+                  <a:txBody>
+                    <a:bodyPr/>
+                    <a:lstStyle/>
+                    <a:p>
+                      <a:r>
+                        <a:rPr lang="en-US">
+                          <a:effectLst/>
+                        </a:rPr>
+                        <a:t>0.000</a:t>
+                      </a:r>
+                    </a:p>
+                  </a:txBody>
+                  <a:tcPr marL="76200" marR="76200" marT="38100" marB="38100" anchor="ctr"/>
+                </a:tc>
+                <a:tc>
+                  <a:txBody>
+                    <a:bodyPr/>
+                    <a:lstStyle/>
+                    <a:p>
+                      <a:r>
+                        <a:rPr lang="en-US">
+                          <a:effectLst/>
+                        </a:rPr>
+                        <a:t>0.641</a:t>
+                      </a:r>
+                    </a:p>
+                  </a:txBody>
+                  <a:tcPr marL="76200" marR="76200" marT="38100" marB="38100" anchor="ctr"/>
+                </a:tc>
+                <a:tc>
+                  <a:txBody>
+                    <a:bodyPr/>
+                    <a:lstStyle/>
+                    <a:p>
+                      <a:r>
+                        <a:rPr lang="en-US">
+                          <a:effectLst/>
+                        </a:rPr>
+                        <a:t>0.696</a:t>
+                      </a:r>
+                    </a:p>
+                  </a:txBody>
+                  <a:tcPr marL="76200" marR="76200" marT="38100" marB="38100" anchor="ctr"/>
+                </a:tc>
+                <a:extLst>
+                  <a:ext uri="{0D108BD9-81ED-4DB2-BD59-A6C34878D82A}">
+                    <a16:rowId xmlns:a16="http://schemas.microsoft.com/office/drawing/2014/main" val="4063831751"/>
+                  </a:ext>
+                </a:extLst>
+              </a:tr>
+              <a:tr h="360938">
+                <a:tc>
+                  <a:txBody>
+                    <a:bodyPr/>
+                    <a:lstStyle/>
+                    <a:p>
+                      <a:pPr algn="r" fontAlgn="ctr"/>
+                      <a:r>
+                        <a:rPr lang="en-US" b="0">
+                          <a:effectLst/>
+                        </a:rPr>
+                        <a:t>ocean_proximity_&lt;1H OCEAN</a:t>
+                      </a:r>
+                    </a:p>
+                  </a:txBody>
+                  <a:tcPr marL="76200" marR="76200" marT="38100" marB="38100" anchor="ctr"/>
+                </a:tc>
+                <a:tc>
+                  <a:txBody>
+                    <a:bodyPr/>
+                    <a:lstStyle/>
+                    <a:p>
+                      <a:r>
+                        <a:rPr lang="en-US">
+                          <a:effectLst/>
+                        </a:rPr>
+                        <a:t>0.1115</a:t>
+                      </a:r>
+                    </a:p>
+                  </a:txBody>
+                  <a:tcPr marL="76200" marR="76200" marT="38100" marB="38100" anchor="ctr"/>
+                </a:tc>
+                <a:tc>
+                  <a:txBody>
+                    <a:bodyPr/>
+                    <a:lstStyle/>
+                    <a:p>
+                      <a:r>
+                        <a:rPr lang="en-US">
+                          <a:effectLst/>
+                        </a:rPr>
+                        <a:t>0.018</a:t>
+                      </a:r>
+                    </a:p>
+                  </a:txBody>
+                  <a:tcPr marL="76200" marR="76200" marT="38100" marB="38100" anchor="ctr"/>
+                </a:tc>
+                <a:tc>
+                  <a:txBody>
+                    <a:bodyPr/>
+                    <a:lstStyle/>
+                    <a:p>
+                      <a:r>
+                        <a:rPr lang="en-US">
+                          <a:effectLst/>
+                        </a:rPr>
+                        <a:t>6.110</a:t>
+                      </a:r>
+                    </a:p>
+                  </a:txBody>
+                  <a:tcPr marL="76200" marR="76200" marT="38100" marB="38100" anchor="ctr"/>
+                </a:tc>
+                <a:tc>
+                  <a:txBody>
+                    <a:bodyPr/>
+                    <a:lstStyle/>
+                    <a:p>
+                      <a:r>
+                        <a:rPr lang="en-US">
+                          <a:effectLst/>
+                        </a:rPr>
+                        <a:t>0.000</a:t>
+                      </a:r>
+                    </a:p>
+                  </a:txBody>
+                  <a:tcPr marL="76200" marR="76200" marT="38100" marB="38100" anchor="ctr"/>
+                </a:tc>
+                <a:tc>
+                  <a:txBody>
+                    <a:bodyPr/>
+                    <a:lstStyle/>
+                    <a:p>
+                      <a:r>
+                        <a:rPr lang="en-US">
+                          <a:effectLst/>
+                        </a:rPr>
+                        <a:t>0.076</a:t>
+                      </a:r>
+                    </a:p>
+                  </a:txBody>
+                  <a:tcPr marL="76200" marR="76200" marT="38100" marB="38100" anchor="ctr"/>
+                </a:tc>
+                <a:tc>
+                  <a:txBody>
+                    <a:bodyPr/>
+                    <a:lstStyle/>
+                    <a:p>
+                      <a:r>
+                        <a:rPr lang="en-US">
+                          <a:effectLst/>
+                        </a:rPr>
+                        <a:t>0.147</a:t>
+                      </a:r>
+                    </a:p>
+                  </a:txBody>
+                  <a:tcPr marL="76200" marR="76200" marT="38100" marB="38100" anchor="ctr"/>
+                </a:tc>
+                <a:extLst>
+                  <a:ext uri="{0D108BD9-81ED-4DB2-BD59-A6C34878D82A}">
+                    <a16:rowId xmlns:a16="http://schemas.microsoft.com/office/drawing/2014/main" val="1956852783"/>
+                  </a:ext>
+                </a:extLst>
+              </a:tr>
+              <a:tr h="360938">
+                <a:tc>
+                  <a:txBody>
+                    <a:bodyPr/>
+                    <a:lstStyle/>
+                    <a:p>
+                      <a:pPr algn="r" fontAlgn="ctr"/>
+                      <a:r>
+                        <a:rPr lang="en-US" b="0">
+                          <a:effectLst/>
+                        </a:rPr>
+                        <a:t>ocean_proximity_INLAND</a:t>
+                      </a:r>
+                    </a:p>
+                  </a:txBody>
+                  <a:tcPr marL="76200" marR="76200" marT="38100" marB="38100" anchor="ctr"/>
+                </a:tc>
+                <a:tc>
+                  <a:txBody>
+                    <a:bodyPr/>
+                    <a:lstStyle/>
+                    <a:p>
+                      <a:r>
+                        <a:rPr lang="en-US">
+                          <a:effectLst/>
+                        </a:rPr>
+                        <a:t>-0.2170</a:t>
+                      </a:r>
+                    </a:p>
+                  </a:txBody>
+                  <a:tcPr marL="76200" marR="76200" marT="38100" marB="38100" anchor="ctr"/>
+                </a:tc>
+                <a:tc>
+                  <a:txBody>
+                    <a:bodyPr/>
+                    <a:lstStyle/>
+                    <a:p>
+                      <a:r>
+                        <a:rPr lang="en-US">
+                          <a:effectLst/>
+                        </a:rPr>
+                        <a:t>0.027</a:t>
+                      </a:r>
+                    </a:p>
+                  </a:txBody>
+                  <a:tcPr marL="76200" marR="76200" marT="38100" marB="38100" anchor="ctr"/>
+                </a:tc>
+                <a:tc>
+                  <a:txBody>
+                    <a:bodyPr/>
+                    <a:lstStyle/>
+                    <a:p>
+                      <a:r>
+                        <a:rPr lang="en-US">
+                          <a:effectLst/>
+                        </a:rPr>
+                        <a:t>-8.092</a:t>
+                      </a:r>
+                    </a:p>
+                  </a:txBody>
+                  <a:tcPr marL="76200" marR="76200" marT="38100" marB="38100" anchor="ctr"/>
+                </a:tc>
+                <a:tc>
+                  <a:txBody>
+                    <a:bodyPr/>
+                    <a:lstStyle/>
+                    <a:p>
+                      <a:r>
+                        <a:rPr lang="en-US">
+                          <a:effectLst/>
+                        </a:rPr>
+                        <a:t>0.000</a:t>
+                      </a:r>
+                    </a:p>
+                  </a:txBody>
+                  <a:tcPr marL="76200" marR="76200" marT="38100" marB="38100" anchor="ctr"/>
+                </a:tc>
+                <a:tc>
+                  <a:txBody>
+                    <a:bodyPr/>
+                    <a:lstStyle/>
+                    <a:p>
+                      <a:r>
+                        <a:rPr lang="en-US">
+                          <a:effectLst/>
+                        </a:rPr>
+                        <a:t>-0.270</a:t>
+                      </a:r>
+                    </a:p>
+                  </a:txBody>
+                  <a:tcPr marL="76200" marR="76200" marT="38100" marB="38100" anchor="ctr"/>
+                </a:tc>
+                <a:tc>
+                  <a:txBody>
+                    <a:bodyPr/>
+                    <a:lstStyle/>
+                    <a:p>
+                      <a:r>
+                        <a:rPr lang="en-US">
+                          <a:effectLst/>
+                        </a:rPr>
+                        <a:t>-0.164</a:t>
+                      </a:r>
+                    </a:p>
+                  </a:txBody>
+                  <a:tcPr marL="76200" marR="76200" marT="38100" marB="38100" anchor="ctr"/>
+                </a:tc>
+                <a:extLst>
+                  <a:ext uri="{0D108BD9-81ED-4DB2-BD59-A6C34878D82A}">
+                    <a16:rowId xmlns:a16="http://schemas.microsoft.com/office/drawing/2014/main" val="875234809"/>
+                  </a:ext>
+                </a:extLst>
+              </a:tr>
+              <a:tr h="360938">
+                <a:tc>
+                  <a:txBody>
+                    <a:bodyPr/>
+                    <a:lstStyle/>
+                    <a:p>
+                      <a:pPr algn="r" fontAlgn="ctr"/>
+                      <a:r>
+                        <a:rPr lang="en-US" b="0">
+                          <a:effectLst/>
+                        </a:rPr>
+                        <a:t>ocean_proximity_ISLAND</a:t>
+                      </a:r>
+                    </a:p>
+                  </a:txBody>
+                  <a:tcPr marL="76200" marR="76200" marT="38100" marB="38100" anchor="ctr"/>
+                </a:tc>
+                <a:tc>
+                  <a:txBody>
+                    <a:bodyPr/>
+                    <a:lstStyle/>
+                    <a:p>
+                      <a:r>
+                        <a:rPr lang="en-US">
+                          <a:effectLst/>
+                        </a:rPr>
+                        <a:t>0.4481</a:t>
+                      </a:r>
+                    </a:p>
+                  </a:txBody>
+                  <a:tcPr marL="76200" marR="76200" marT="38100" marB="38100" anchor="ctr"/>
+                </a:tc>
+                <a:tc>
+                  <a:txBody>
+                    <a:bodyPr/>
+                    <a:lstStyle/>
+                    <a:p>
+                      <a:r>
+                        <a:rPr lang="en-US">
+                          <a:effectLst/>
+                        </a:rPr>
+                        <a:t>0.574</a:t>
+                      </a:r>
+                    </a:p>
+                  </a:txBody>
+                  <a:tcPr marL="76200" marR="76200" marT="38100" marB="38100" anchor="ctr"/>
+                </a:tc>
+                <a:tc>
+                  <a:txBody>
+                    <a:bodyPr/>
+                    <a:lstStyle/>
+                    <a:p>
+                      <a:r>
+                        <a:rPr lang="en-US">
+                          <a:effectLst/>
+                        </a:rPr>
+                        <a:t>0.781</a:t>
+                      </a:r>
+                    </a:p>
+                  </a:txBody>
+                  <a:tcPr marL="76200" marR="76200" marT="38100" marB="38100" anchor="ctr"/>
+                </a:tc>
+                <a:tc>
+                  <a:txBody>
+                    <a:bodyPr/>
+                    <a:lstStyle/>
+                    <a:p>
+                      <a:r>
+                        <a:rPr lang="en-US">
+                          <a:effectLst/>
+                        </a:rPr>
+                        <a:t>0.435</a:t>
+                      </a:r>
+                    </a:p>
+                  </a:txBody>
+                  <a:tcPr marL="76200" marR="76200" marT="38100" marB="38100" anchor="ctr"/>
+                </a:tc>
+                <a:tc>
+                  <a:txBody>
+                    <a:bodyPr/>
+                    <a:lstStyle/>
+                    <a:p>
+                      <a:r>
+                        <a:rPr lang="en-US">
+                          <a:effectLst/>
+                        </a:rPr>
+                        <a:t>-0.677</a:t>
+                      </a:r>
+                    </a:p>
+                  </a:txBody>
+                  <a:tcPr marL="76200" marR="76200" marT="38100" marB="38100" anchor="ctr"/>
+                </a:tc>
+                <a:tc>
+                  <a:txBody>
+                    <a:bodyPr/>
+                    <a:lstStyle/>
+                    <a:p>
+                      <a:r>
+                        <a:rPr lang="en-US">
+                          <a:effectLst/>
+                        </a:rPr>
+                        <a:t>1.573</a:t>
+                      </a:r>
+                    </a:p>
+                  </a:txBody>
+                  <a:tcPr marL="76200" marR="76200" marT="38100" marB="38100" anchor="ctr"/>
+                </a:tc>
+                <a:extLst>
+                  <a:ext uri="{0D108BD9-81ED-4DB2-BD59-A6C34878D82A}">
+                    <a16:rowId xmlns:a16="http://schemas.microsoft.com/office/drawing/2014/main" val="661631323"/>
+                  </a:ext>
+                </a:extLst>
+              </a:tr>
+              <a:tr h="360938">
+                <a:tc>
+                  <a:txBody>
+                    <a:bodyPr/>
+                    <a:lstStyle/>
+                    <a:p>
+                      <a:pPr algn="r" fontAlgn="ctr"/>
+                      <a:r>
+                        <a:rPr lang="en-US" b="0">
+                          <a:effectLst/>
+                        </a:rPr>
+                        <a:t>ocean_proximity_NEAR BAY</a:t>
+                      </a:r>
+                    </a:p>
+                  </a:txBody>
+                  <a:tcPr marL="76200" marR="76200" marT="38100" marB="38100" anchor="ctr"/>
+                </a:tc>
+                <a:tc>
+                  <a:txBody>
+                    <a:bodyPr/>
+                    <a:lstStyle/>
+                    <a:p>
+                      <a:r>
+                        <a:rPr lang="en-US">
+                          <a:effectLst/>
+                        </a:rPr>
+                        <a:t>0.0405</a:t>
+                      </a:r>
+                    </a:p>
+                  </a:txBody>
+                  <a:tcPr marL="76200" marR="76200" marT="38100" marB="38100" anchor="ctr"/>
+                </a:tc>
+                <a:tc>
+                  <a:txBody>
+                    <a:bodyPr/>
+                    <a:lstStyle/>
+                    <a:p>
+                      <a:r>
+                        <a:rPr lang="en-US">
+                          <a:effectLst/>
+                        </a:rPr>
+                        <a:t>0.038</a:t>
+                      </a:r>
+                    </a:p>
+                  </a:txBody>
+                  <a:tcPr marL="76200" marR="76200" marT="38100" marB="38100" anchor="ctr"/>
+                </a:tc>
+                <a:tc>
+                  <a:txBody>
+                    <a:bodyPr/>
+                    <a:lstStyle/>
+                    <a:p>
+                      <a:r>
+                        <a:rPr lang="en-US">
+                          <a:effectLst/>
+                        </a:rPr>
+                        <a:t>1.079</a:t>
+                      </a:r>
+                    </a:p>
+                  </a:txBody>
+                  <a:tcPr marL="76200" marR="76200" marT="38100" marB="38100" anchor="ctr"/>
+                </a:tc>
+                <a:tc>
+                  <a:txBody>
+                    <a:bodyPr/>
+                    <a:lstStyle/>
+                    <a:p>
+                      <a:r>
+                        <a:rPr lang="en-US">
+                          <a:effectLst/>
+                        </a:rPr>
+                        <a:t>0.281</a:t>
+                      </a:r>
+                    </a:p>
+                  </a:txBody>
+                  <a:tcPr marL="76200" marR="76200" marT="38100" marB="38100" anchor="ctr"/>
+                </a:tc>
+                <a:tc>
+                  <a:txBody>
+                    <a:bodyPr/>
+                    <a:lstStyle/>
+                    <a:p>
+                      <a:r>
+                        <a:rPr lang="en-US">
+                          <a:effectLst/>
+                        </a:rPr>
+                        <a:t>-0.033</a:t>
+                      </a:r>
+                    </a:p>
+                  </a:txBody>
+                  <a:tcPr marL="76200" marR="76200" marT="38100" marB="38100" anchor="ctr"/>
+                </a:tc>
+                <a:tc>
+                  <a:txBody>
+                    <a:bodyPr/>
+                    <a:lstStyle/>
+                    <a:p>
+                      <a:r>
+                        <a:rPr lang="en-US">
+                          <a:effectLst/>
+                        </a:rPr>
+                        <a:t>0.114</a:t>
+                      </a:r>
+                    </a:p>
+                  </a:txBody>
+                  <a:tcPr marL="76200" marR="76200" marT="38100" marB="38100" anchor="ctr"/>
+                </a:tc>
+                <a:extLst>
+                  <a:ext uri="{0D108BD9-81ED-4DB2-BD59-A6C34878D82A}">
+                    <a16:rowId xmlns:a16="http://schemas.microsoft.com/office/drawing/2014/main" val="664701145"/>
+                  </a:ext>
+                </a:extLst>
+              </a:tr>
+              <a:tr h="360938">
+                <a:tc>
+                  <a:txBody>
+                    <a:bodyPr/>
+                    <a:lstStyle/>
+                    <a:p>
+                      <a:pPr algn="r" fontAlgn="ctr"/>
+                      <a:r>
+                        <a:rPr lang="en-US" b="0">
+                          <a:effectLst/>
+                        </a:rPr>
+                        <a:t>ocean_proximity_NEAR OCEAN</a:t>
+                      </a:r>
+                    </a:p>
+                  </a:txBody>
+                  <a:tcPr marL="76200" marR="76200" marT="38100" marB="38100" anchor="ctr"/>
+                </a:tc>
+                <a:tc>
+                  <a:txBody>
+                    <a:bodyPr/>
+                    <a:lstStyle/>
+                    <a:p>
+                      <a:r>
+                        <a:rPr lang="en-US">
+                          <a:effectLst/>
+                        </a:rPr>
+                        <a:t>0.1453</a:t>
+                      </a:r>
+                    </a:p>
+                  </a:txBody>
+                  <a:tcPr marL="76200" marR="76200" marT="38100" marB="38100" anchor="ctr"/>
+                </a:tc>
+                <a:tc>
+                  <a:txBody>
+                    <a:bodyPr/>
+                    <a:lstStyle/>
+                    <a:p>
+                      <a:r>
+                        <a:rPr lang="en-US" dirty="0">
+                          <a:effectLst/>
+                        </a:rPr>
+                        <a:t>0.034</a:t>
+                      </a:r>
+                    </a:p>
+                  </a:txBody>
+                  <a:tcPr marL="76200" marR="76200" marT="38100" marB="38100" anchor="ctr"/>
+                </a:tc>
+                <a:tc>
+                  <a:txBody>
+                    <a:bodyPr/>
+                    <a:lstStyle/>
+                    <a:p>
+                      <a:r>
+                        <a:rPr lang="en-US">
+                          <a:effectLst/>
+                        </a:rPr>
+                        <a:t>4.287</a:t>
+                      </a:r>
+                    </a:p>
+                  </a:txBody>
+                  <a:tcPr marL="76200" marR="76200" marT="38100" marB="38100" anchor="ctr"/>
+                </a:tc>
+                <a:tc>
+                  <a:txBody>
+                    <a:bodyPr/>
+                    <a:lstStyle/>
+                    <a:p>
+                      <a:r>
+                        <a:rPr lang="en-US">
+                          <a:effectLst/>
+                        </a:rPr>
+                        <a:t>0.000</a:t>
+                      </a:r>
+                    </a:p>
+                  </a:txBody>
+                  <a:tcPr marL="76200" marR="76200" marT="38100" marB="38100" anchor="ctr"/>
+                </a:tc>
+                <a:tc>
+                  <a:txBody>
+                    <a:bodyPr/>
+                    <a:lstStyle/>
+                    <a:p>
+                      <a:r>
+                        <a:rPr lang="en-US" dirty="0">
+                          <a:effectLst/>
+                        </a:rPr>
+                        <a:t>0.079</a:t>
+                      </a:r>
+                    </a:p>
+                  </a:txBody>
+                  <a:tcPr marL="76200" marR="76200" marT="38100" marB="38100" anchor="ctr"/>
+                </a:tc>
+                <a:tc>
+                  <a:txBody>
+                    <a:bodyPr/>
+                    <a:lstStyle/>
+                    <a:p>
+                      <a:r>
+                        <a:rPr lang="en-US" dirty="0">
+                          <a:effectLst/>
+                        </a:rPr>
+                        <a:t>0.212</a:t>
+                      </a:r>
+                    </a:p>
+                  </a:txBody>
+                  <a:tcPr marL="76200" marR="76200" marT="38100" marB="38100" anchor="ctr"/>
+                </a:tc>
+                <a:extLst>
+                  <a:ext uri="{0D108BD9-81ED-4DB2-BD59-A6C34878D82A}">
+                    <a16:rowId xmlns:a16="http://schemas.microsoft.com/office/drawing/2014/main" val="2718979038"/>
+                  </a:ext>
+                </a:extLst>
+              </a:tr>
+            </a:tbl>
+          </a:graphicData>
+        </a:graphic>
+      </p:graphicFrame>
     </p:spTree>
   </p:cSld>
   <p:clrMapOvr>
@@ -8737,12 +10877,9 @@
 </file>
 
 <file path=customXml/item1.xml><?xml version="1.0" encoding="utf-8"?>
-<?mso-contentType ?>
-<FormTemplates xmlns="http://schemas.microsoft.com/sharepoint/v3/contenttype/forms">
-  <Display>DocumentLibraryForm</Display>
-  <Edit>DocumentLibraryForm</Edit>
-  <New>DocumentLibraryForm</New>
-</FormTemplates>
+<p:properties xmlns:p="http://schemas.microsoft.com/office/2006/metadata/properties" xmlns:xsi="http://www.w3.org/2001/XMLSchema-instance" xmlns:pc="http://schemas.microsoft.com/office/infopath/2007/PartnerControls">
+  <documentManagement/>
+</p:properties>
 </file>
 
 <file path=customXml/item2.xml><?xml version="1.0" encoding="utf-8"?>
@@ -8975,15 +11112,27 @@
 </file>
 
 <file path=customXml/item3.xml><?xml version="1.0" encoding="utf-8"?>
-<p:properties xmlns:p="http://schemas.microsoft.com/office/2006/metadata/properties" xmlns:xsi="http://www.w3.org/2001/XMLSchema-instance" xmlns:pc="http://schemas.microsoft.com/office/infopath/2007/PartnerControls">
-  <documentManagement/>
-</p:properties>
+<?mso-contentType ?>
+<FormTemplates xmlns="http://schemas.microsoft.com/sharepoint/v3/contenttype/forms">
+  <Display>DocumentLibraryForm</Display>
+  <Edit>DocumentLibraryForm</Edit>
+  <New>DocumentLibraryForm</New>
+</FormTemplates>
 </file>
 
 <file path=customXml/itemProps1.xml><?xml version="1.0" encoding="utf-8"?>
-<ds:datastoreItem xmlns:ds="http://schemas.openxmlformats.org/officeDocument/2006/customXml" ds:itemID="{DB660E73-876B-428D-8490-3250031BCA46}">
+<ds:datastoreItem xmlns:ds="http://schemas.openxmlformats.org/officeDocument/2006/customXml" ds:itemID="{8F99C934-8F77-4DD9-B557-EEC39045F042}">
   <ds:schemaRefs>
-    <ds:schemaRef ds:uri="http://schemas.microsoft.com/sharepoint/v3/contenttype/forms"/>
+    <ds:schemaRef ds:uri="http://www.w3.org/XML/1998/namespace"/>
+    <ds:schemaRef ds:uri="http://purl.org/dc/terms/"/>
+    <ds:schemaRef ds:uri="http://schemas.microsoft.com/office/2006/documentManagement/types"/>
+    <ds:schemaRef ds:uri="cb290d18-a6bb-4986-8cd8-a2fc19ebc901"/>
+    <ds:schemaRef ds:uri="http://purl.org/dc/dcmitype/"/>
+    <ds:schemaRef ds:uri="http://purl.org/dc/elements/1.1/"/>
+    <ds:schemaRef ds:uri="c08b6b52-cd5f-4467-8eb8-47e70e31f32d"/>
+    <ds:schemaRef ds:uri="http://schemas.microsoft.com/office/infopath/2007/PartnerControls"/>
+    <ds:schemaRef ds:uri="http://schemas.openxmlformats.org/package/2006/metadata/core-properties"/>
+    <ds:schemaRef ds:uri="http://schemas.microsoft.com/office/2006/metadata/properties"/>
   </ds:schemaRefs>
 </ds:datastoreItem>
 </file>
@@ -9008,18 +11157,9 @@
 </file>
 
 <file path=customXml/itemProps3.xml><?xml version="1.0" encoding="utf-8"?>
-<ds:datastoreItem xmlns:ds="http://schemas.openxmlformats.org/officeDocument/2006/customXml" ds:itemID="{8F99C934-8F77-4DD9-B557-EEC39045F042}">
+<ds:datastoreItem xmlns:ds="http://schemas.openxmlformats.org/officeDocument/2006/customXml" ds:itemID="{DB660E73-876B-428D-8490-3250031BCA46}">
   <ds:schemaRefs>
-    <ds:schemaRef ds:uri="http://purl.org/dc/dcmitype/"/>
-    <ds:schemaRef ds:uri="cb290d18-a6bb-4986-8cd8-a2fc19ebc901"/>
-    <ds:schemaRef ds:uri="http://schemas.microsoft.com/office/infopath/2007/PartnerControls"/>
-    <ds:schemaRef ds:uri="http://www.w3.org/XML/1998/namespace"/>
-    <ds:schemaRef ds:uri="http://schemas.microsoft.com/office/2006/metadata/properties"/>
-    <ds:schemaRef ds:uri="http://purl.org/dc/terms/"/>
-    <ds:schemaRef ds:uri="http://schemas.microsoft.com/office/2006/documentManagement/types"/>
-    <ds:schemaRef ds:uri="http://purl.org/dc/elements/1.1/"/>
-    <ds:schemaRef ds:uri="http://schemas.openxmlformats.org/package/2006/metadata/core-properties"/>
-    <ds:schemaRef ds:uri="c08b6b52-cd5f-4467-8eb8-47e70e31f32d"/>
+    <ds:schemaRef ds:uri="http://schemas.microsoft.com/sharepoint/v3/contenttype/forms"/>
   </ds:schemaRefs>
 </ds:datastoreItem>
 </file>
</xml_diff>